<commit_message>
lesson 1: re-order sections
</commit_message>
<xml_diff>
--- a/week1/slides.pptx
+++ b/week1/slides.pptx
@@ -17,8 +17,8 @@
     <p:sldId id="262" r:id="rId5"/>
     <p:sldId id="263" r:id="rId6"/>
     <p:sldId id="264" r:id="rId7"/>
-    <p:sldId id="265" r:id="rId8"/>
-    <p:sldId id="266" r:id="rId9"/>
+    <p:sldId id="266" r:id="rId8"/>
+    <p:sldId id="265" r:id="rId9"/>
     <p:sldId id="269" r:id="rId10"/>
     <p:sldId id="267" r:id="rId11"/>
     <p:sldId id="268" r:id="rId12"/>
@@ -227,7 +227,7 @@
           <a:p>
             <a:fld id="{2A630CD7-7FE1-B54D-B02D-38F5B6EAB555}" type="datetimeFigureOut">
               <a:rPr lang="en-BE" smtClean="0"/>
-              <a:t>06/02/2025</a:t>
+              <a:t>07/02/2025</a:t>
             </a:fld>
             <a:endParaRPr lang="en-BE"/>
           </a:p>
@@ -404,7 +404,7 @@
           <a:p>
             <a:fld id="{4C3D1D5E-8C93-9246-8E36-76148285B044}" type="datetimeFigureOut">
               <a:rPr lang="en-BE" smtClean="0"/>
-              <a:t>06/02/2025</a:t>
+              <a:t>07/02/2025</a:t>
             </a:fld>
             <a:endParaRPr lang="en-BE"/>
           </a:p>
@@ -3026,187 +3026,6 @@
           <a:p>
             <a:r>
               <a:rPr lang="en-GB" b="1" dirty="0"/>
-              <a:t>Loops (~30 min)</a:t>
-            </a:r>
-          </a:p>
-          <a:p>
-            <a:endParaRPr lang="en-GB" b="1" dirty="0"/>
-          </a:p>
-          <a:p>
-            <a:r>
-              <a:rPr lang="en-BE" dirty="0"/>
-              <a:t>📝 </a:t>
-            </a:r>
-            <a:r>
-              <a:rPr lang="en-GB" b="1" dirty="0"/>
-              <a:t>Explain: </a:t>
-            </a:r>
-            <a:r>
-              <a:rPr lang="en-GB" i="0" dirty="0"/>
-              <a:t>Loops allow us to repeat actions. C# has for, while, and foreach.</a:t>
-            </a:r>
-          </a:p>
-          <a:p>
-            <a:endParaRPr lang="en-GB" i="0" dirty="0"/>
-          </a:p>
-          <a:p>
-            <a:r>
-              <a:rPr lang="en-BE" dirty="0"/>
-              <a:t>👨‍💻 </a:t>
-            </a:r>
-            <a:r>
-              <a:rPr lang="en-GB" b="1" dirty="0"/>
-              <a:t>Live Coding:</a:t>
-            </a:r>
-            <a:r>
-              <a:rPr lang="en-GB" b="0" dirty="0"/>
-              <a:t> Showcase Rider autocomplete.</a:t>
-            </a:r>
-            <a:endParaRPr lang="en-GB" b="1" dirty="0"/>
-          </a:p>
-          <a:p>
-            <a:endParaRPr lang="en-GB" b="1" dirty="0"/>
-          </a:p>
-          <a:p>
-            <a:r>
-              <a:rPr lang="en-BE" dirty="0"/>
-              <a:t>🎯 </a:t>
-            </a:r>
-            <a:r>
-              <a:rPr lang="en-GB" b="1" dirty="0"/>
-              <a:t>Ask Students:</a:t>
-            </a:r>
-          </a:p>
-          <a:p>
-            <a:pPr marL="171450" indent="-171450">
-              <a:buFont typeface="Arial" panose="020B0604020202020204" pitchFamily="34" charset="0"/>
-              <a:buChar char="•"/>
-            </a:pPr>
-            <a:r>
-              <a:rPr lang="en-GB" dirty="0"/>
-              <a:t>When would you use for instead of while?</a:t>
-            </a:r>
-          </a:p>
-          <a:p>
-            <a:pPr marL="171450" marR="0" lvl="0" indent="-171450" algn="l" defTabSz="914400" rtl="0" eaLnBrk="1" fontAlgn="auto" latinLnBrk="0" hangingPunct="1">
-              <a:lnSpc>
-                <a:spcPct val="100000"/>
-              </a:lnSpc>
-              <a:spcBef>
-                <a:spcPts val="0"/>
-              </a:spcBef>
-              <a:spcAft>
-                <a:spcPts val="0"/>
-              </a:spcAft>
-              <a:buClrTx/>
-              <a:buSzTx/>
-              <a:buFont typeface="Arial" panose="020B0604020202020204" pitchFamily="34" charset="0"/>
-              <a:buChar char="•"/>
-              <a:tabLst/>
-              <a:defRPr/>
-            </a:pPr>
-            <a:r>
-              <a:rPr lang="en-GB" dirty="0"/>
-              <a:t>Write a loop that prints numbers 1 to 10.</a:t>
-            </a:r>
-          </a:p>
-          <a:p>
-            <a:endParaRPr lang="en-GB" dirty="0"/>
-          </a:p>
-          <a:p>
-            <a:endParaRPr lang="en-GB" dirty="0"/>
-          </a:p>
-          <a:p>
-            <a:pPr marL="171450" indent="-171450">
-              <a:buFont typeface="Arial" panose="020B0604020202020204" pitchFamily="34" charset="0"/>
-              <a:buChar char="•"/>
-            </a:pPr>
-            <a:endParaRPr lang="en-BE" dirty="0"/>
-          </a:p>
-        </p:txBody>
-      </p:sp>
-      <p:sp>
-        <p:nvSpPr>
-          <p:cNvPr id="4" name="Slide Number Placeholder 3"/>
-          <p:cNvSpPr>
-            <a:spLocks noGrp="1"/>
-          </p:cNvSpPr>
-          <p:nvPr>
-            <p:ph type="sldNum" sz="quarter" idx="5"/>
-          </p:nvPr>
-        </p:nvSpPr>
-        <p:spPr/>
-        <p:txBody>
-          <a:bodyPr/>
-          <a:lstStyle/>
-          <a:p>
-            <a:fld id="{B5B5D2F2-0645-2F4D-9BDF-164597C58BBD}" type="slidenum">
-              <a:rPr lang="en-BE" smtClean="0"/>
-              <a:t>7</a:t>
-            </a:fld>
-            <a:endParaRPr lang="en-BE"/>
-          </a:p>
-        </p:txBody>
-      </p:sp>
-    </p:spTree>
-    <p:extLst>
-      <p:ext uri="{BB962C8B-B14F-4D97-AF65-F5344CB8AC3E}">
-        <p14:creationId xmlns:p14="http://schemas.microsoft.com/office/powerpoint/2010/main" val="1257360948"/>
-      </p:ext>
-    </p:extLst>
-  </p:cSld>
-  <p:clrMapOvr>
-    <a:masterClrMapping/>
-  </p:clrMapOvr>
-</p:notes>
-</file>
-
-<file path=ppt/notesSlides/notesSlide8.xml><?xml version="1.0" encoding="utf-8"?>
-<p:notes xmlns:a="http://schemas.openxmlformats.org/drawingml/2006/main" xmlns:r="http://schemas.openxmlformats.org/officeDocument/2006/relationships" xmlns:p="http://schemas.openxmlformats.org/presentationml/2006/main">
-  <p:cSld>
-    <p:spTree>
-      <p:nvGrpSpPr>
-        <p:cNvPr id="1" name=""/>
-        <p:cNvGrpSpPr/>
-        <p:nvPr/>
-      </p:nvGrpSpPr>
-      <p:grpSpPr>
-        <a:xfrm>
-          <a:off x="0" y="0"/>
-          <a:ext cx="0" cy="0"/>
-          <a:chOff x="0" y="0"/>
-          <a:chExt cx="0" cy="0"/>
-        </a:xfrm>
-      </p:grpSpPr>
-      <p:sp>
-        <p:nvSpPr>
-          <p:cNvPr id="2" name="Slide Image Placeholder 1"/>
-          <p:cNvSpPr>
-            <a:spLocks noGrp="1" noRot="1" noChangeAspect="1"/>
-          </p:cNvSpPr>
-          <p:nvPr>
-            <p:ph type="sldImg"/>
-          </p:nvPr>
-        </p:nvSpPr>
-        <p:spPr/>
-      </p:sp>
-      <p:sp>
-        <p:nvSpPr>
-          <p:cNvPr id="3" name="Notes Placeholder 2"/>
-          <p:cNvSpPr>
-            <a:spLocks noGrp="1"/>
-          </p:cNvSpPr>
-          <p:nvPr>
-            <p:ph type="body" idx="1"/>
-          </p:nvPr>
-        </p:nvSpPr>
-        <p:spPr/>
-        <p:txBody>
-          <a:bodyPr/>
-          <a:lstStyle/>
-          <a:p>
-            <a:r>
-              <a:rPr lang="en-GB" b="1" dirty="0"/>
               <a:t>Arrays (~30 min)</a:t>
             </a:r>
           </a:p>
@@ -3334,6 +3153,187 @@
           <a:p>
             <a:fld id="{B5B5D2F2-0645-2F4D-9BDF-164597C58BBD}" type="slidenum">
               <a:rPr lang="en-BE" smtClean="0"/>
+              <a:t>7</a:t>
+            </a:fld>
+            <a:endParaRPr lang="en-BE"/>
+          </a:p>
+        </p:txBody>
+      </p:sp>
+    </p:spTree>
+    <p:extLst>
+      <p:ext uri="{BB962C8B-B14F-4D97-AF65-F5344CB8AC3E}">
+        <p14:creationId xmlns:p14="http://schemas.microsoft.com/office/powerpoint/2010/main" val="1960569126"/>
+      </p:ext>
+    </p:extLst>
+  </p:cSld>
+  <p:clrMapOvr>
+    <a:masterClrMapping/>
+  </p:clrMapOvr>
+</p:notes>
+</file>
+
+<file path=ppt/notesSlides/notesSlide8.xml><?xml version="1.0" encoding="utf-8"?>
+<p:notes xmlns:a="http://schemas.openxmlformats.org/drawingml/2006/main" xmlns:r="http://schemas.openxmlformats.org/officeDocument/2006/relationships" xmlns:p="http://schemas.openxmlformats.org/presentationml/2006/main">
+  <p:cSld>
+    <p:spTree>
+      <p:nvGrpSpPr>
+        <p:cNvPr id="1" name=""/>
+        <p:cNvGrpSpPr/>
+        <p:nvPr/>
+      </p:nvGrpSpPr>
+      <p:grpSpPr>
+        <a:xfrm>
+          <a:off x="0" y="0"/>
+          <a:ext cx="0" cy="0"/>
+          <a:chOff x="0" y="0"/>
+          <a:chExt cx="0" cy="0"/>
+        </a:xfrm>
+      </p:grpSpPr>
+      <p:sp>
+        <p:nvSpPr>
+          <p:cNvPr id="2" name="Slide Image Placeholder 1"/>
+          <p:cNvSpPr>
+            <a:spLocks noGrp="1" noRot="1" noChangeAspect="1"/>
+          </p:cNvSpPr>
+          <p:nvPr>
+            <p:ph type="sldImg"/>
+          </p:nvPr>
+        </p:nvSpPr>
+        <p:spPr/>
+      </p:sp>
+      <p:sp>
+        <p:nvSpPr>
+          <p:cNvPr id="3" name="Notes Placeholder 2"/>
+          <p:cNvSpPr>
+            <a:spLocks noGrp="1"/>
+          </p:cNvSpPr>
+          <p:nvPr>
+            <p:ph type="body" idx="1"/>
+          </p:nvPr>
+        </p:nvSpPr>
+        <p:spPr/>
+        <p:txBody>
+          <a:bodyPr/>
+          <a:lstStyle/>
+          <a:p>
+            <a:r>
+              <a:rPr lang="en-GB" b="1" dirty="0"/>
+              <a:t>Loops (~30 min)</a:t>
+            </a:r>
+          </a:p>
+          <a:p>
+            <a:endParaRPr lang="en-GB" b="1" dirty="0"/>
+          </a:p>
+          <a:p>
+            <a:r>
+              <a:rPr lang="en-BE" dirty="0"/>
+              <a:t>📝 </a:t>
+            </a:r>
+            <a:r>
+              <a:rPr lang="en-GB" b="1" dirty="0"/>
+              <a:t>Explain: </a:t>
+            </a:r>
+            <a:r>
+              <a:rPr lang="en-GB" i="0" dirty="0"/>
+              <a:t>Loops allow us to repeat actions. C# has for, while, and foreach.</a:t>
+            </a:r>
+          </a:p>
+          <a:p>
+            <a:endParaRPr lang="en-GB" i="0" dirty="0"/>
+          </a:p>
+          <a:p>
+            <a:r>
+              <a:rPr lang="en-BE" dirty="0"/>
+              <a:t>👨‍💻 </a:t>
+            </a:r>
+            <a:r>
+              <a:rPr lang="en-GB" b="1" dirty="0"/>
+              <a:t>Live Coding:</a:t>
+            </a:r>
+            <a:r>
+              <a:rPr lang="en-GB" b="0" dirty="0"/>
+              <a:t> Showcase Rider autocomplete.</a:t>
+            </a:r>
+            <a:endParaRPr lang="en-GB" b="1" dirty="0"/>
+          </a:p>
+          <a:p>
+            <a:endParaRPr lang="en-GB" b="1" dirty="0"/>
+          </a:p>
+          <a:p>
+            <a:r>
+              <a:rPr lang="en-BE" dirty="0"/>
+              <a:t>🎯 </a:t>
+            </a:r>
+            <a:r>
+              <a:rPr lang="en-GB" b="1" dirty="0"/>
+              <a:t>Ask Students:</a:t>
+            </a:r>
+          </a:p>
+          <a:p>
+            <a:pPr marL="171450" indent="-171450">
+              <a:buFont typeface="Arial" panose="020B0604020202020204" pitchFamily="34" charset="0"/>
+              <a:buChar char="•"/>
+            </a:pPr>
+            <a:r>
+              <a:rPr lang="en-GB" dirty="0"/>
+              <a:t>When would you use for instead of while?</a:t>
+            </a:r>
+          </a:p>
+          <a:p>
+            <a:pPr marL="171450" marR="0" lvl="0" indent="-171450" algn="l" defTabSz="914400" rtl="0" eaLnBrk="1" fontAlgn="auto" latinLnBrk="0" hangingPunct="1">
+              <a:lnSpc>
+                <a:spcPct val="100000"/>
+              </a:lnSpc>
+              <a:spcBef>
+                <a:spcPts val="0"/>
+              </a:spcBef>
+              <a:spcAft>
+                <a:spcPts val="0"/>
+              </a:spcAft>
+              <a:buClrTx/>
+              <a:buSzTx/>
+              <a:buFont typeface="Arial" panose="020B0604020202020204" pitchFamily="34" charset="0"/>
+              <a:buChar char="•"/>
+              <a:tabLst/>
+              <a:defRPr/>
+            </a:pPr>
+            <a:r>
+              <a:rPr lang="en-GB" dirty="0"/>
+              <a:t>Write a loop that prints numbers 1 to 10.</a:t>
+            </a:r>
+          </a:p>
+          <a:p>
+            <a:endParaRPr lang="en-GB" dirty="0"/>
+          </a:p>
+          <a:p>
+            <a:endParaRPr lang="en-GB" dirty="0"/>
+          </a:p>
+          <a:p>
+            <a:pPr marL="171450" indent="-171450">
+              <a:buFont typeface="Arial" panose="020B0604020202020204" pitchFamily="34" charset="0"/>
+              <a:buChar char="•"/>
+            </a:pPr>
+            <a:endParaRPr lang="en-BE" dirty="0"/>
+          </a:p>
+        </p:txBody>
+      </p:sp>
+      <p:sp>
+        <p:nvSpPr>
+          <p:cNvPr id="4" name="Slide Number Placeholder 3"/>
+          <p:cNvSpPr>
+            <a:spLocks noGrp="1"/>
+          </p:cNvSpPr>
+          <p:nvPr>
+            <p:ph type="sldNum" sz="quarter" idx="5"/>
+          </p:nvPr>
+        </p:nvSpPr>
+        <p:spPr/>
+        <p:txBody>
+          <a:bodyPr/>
+          <a:lstStyle/>
+          <a:p>
+            <a:fld id="{B5B5D2F2-0645-2F4D-9BDF-164597C58BBD}" type="slidenum">
+              <a:rPr lang="en-BE" smtClean="0"/>
               <a:t>8</a:t>
             </a:fld>
             <a:endParaRPr lang="en-BE"/>
@@ -3343,7 +3343,7 @@
     </p:spTree>
     <p:extLst>
       <p:ext uri="{BB962C8B-B14F-4D97-AF65-F5344CB8AC3E}">
-        <p14:creationId xmlns:p14="http://schemas.microsoft.com/office/powerpoint/2010/main" val="1960569126"/>
+        <p14:creationId xmlns:p14="http://schemas.microsoft.com/office/powerpoint/2010/main" val="1257360948"/>
       </p:ext>
     </p:extLst>
   </p:cSld>
@@ -3626,7 +3626,7 @@
           <a:p>
             <a:fld id="{A496BEFF-7D57-7742-81E9-2EA9098B873D}" type="datetimeFigureOut">
               <a:rPr lang="en-BE" smtClean="0"/>
-              <a:t>06/02/2025</a:t>
+              <a:t>07/02/2025</a:t>
             </a:fld>
             <a:endParaRPr lang="en-BE"/>
           </a:p>
@@ -3826,7 +3826,7 @@
           <a:p>
             <a:fld id="{A496BEFF-7D57-7742-81E9-2EA9098B873D}" type="datetimeFigureOut">
               <a:rPr lang="en-BE" smtClean="0"/>
-              <a:t>06/02/2025</a:t>
+              <a:t>07/02/2025</a:t>
             </a:fld>
             <a:endParaRPr lang="en-BE"/>
           </a:p>
@@ -4036,7 +4036,7 @@
           <a:p>
             <a:fld id="{A496BEFF-7D57-7742-81E9-2EA9098B873D}" type="datetimeFigureOut">
               <a:rPr lang="en-BE" smtClean="0"/>
-              <a:t>06/02/2025</a:t>
+              <a:t>07/02/2025</a:t>
             </a:fld>
             <a:endParaRPr lang="en-BE"/>
           </a:p>
@@ -4236,7 +4236,7 @@
           <a:p>
             <a:fld id="{A496BEFF-7D57-7742-81E9-2EA9098B873D}" type="datetimeFigureOut">
               <a:rPr lang="en-BE" smtClean="0"/>
-              <a:t>06/02/2025</a:t>
+              <a:t>07/02/2025</a:t>
             </a:fld>
             <a:endParaRPr lang="en-BE"/>
           </a:p>
@@ -4512,7 +4512,7 @@
           <a:p>
             <a:fld id="{A496BEFF-7D57-7742-81E9-2EA9098B873D}" type="datetimeFigureOut">
               <a:rPr lang="en-BE" smtClean="0"/>
-              <a:t>06/02/2025</a:t>
+              <a:t>07/02/2025</a:t>
             </a:fld>
             <a:endParaRPr lang="en-BE"/>
           </a:p>
@@ -4780,7 +4780,7 @@
           <a:p>
             <a:fld id="{A496BEFF-7D57-7742-81E9-2EA9098B873D}" type="datetimeFigureOut">
               <a:rPr lang="en-BE" smtClean="0"/>
-              <a:t>06/02/2025</a:t>
+              <a:t>07/02/2025</a:t>
             </a:fld>
             <a:endParaRPr lang="en-BE"/>
           </a:p>
@@ -5195,7 +5195,7 @@
           <a:p>
             <a:fld id="{A496BEFF-7D57-7742-81E9-2EA9098B873D}" type="datetimeFigureOut">
               <a:rPr lang="en-BE" smtClean="0"/>
-              <a:t>06/02/2025</a:t>
+              <a:t>07/02/2025</a:t>
             </a:fld>
             <a:endParaRPr lang="en-BE"/>
           </a:p>
@@ -5337,7 +5337,7 @@
           <a:p>
             <a:fld id="{A496BEFF-7D57-7742-81E9-2EA9098B873D}" type="datetimeFigureOut">
               <a:rPr lang="en-BE" smtClean="0"/>
-              <a:t>06/02/2025</a:t>
+              <a:t>07/02/2025</a:t>
             </a:fld>
             <a:endParaRPr lang="en-BE"/>
           </a:p>
@@ -5450,7 +5450,7 @@
           <a:p>
             <a:fld id="{A496BEFF-7D57-7742-81E9-2EA9098B873D}" type="datetimeFigureOut">
               <a:rPr lang="en-BE" smtClean="0"/>
-              <a:t>06/02/2025</a:t>
+              <a:t>07/02/2025</a:t>
             </a:fld>
             <a:endParaRPr lang="en-BE"/>
           </a:p>
@@ -5763,7 +5763,7 @@
           <a:p>
             <a:fld id="{A496BEFF-7D57-7742-81E9-2EA9098B873D}" type="datetimeFigureOut">
               <a:rPr lang="en-BE" smtClean="0"/>
-              <a:t>06/02/2025</a:t>
+              <a:t>07/02/2025</a:t>
             </a:fld>
             <a:endParaRPr lang="en-BE"/>
           </a:p>
@@ -6052,7 +6052,7 @@
           <a:p>
             <a:fld id="{A496BEFF-7D57-7742-81E9-2EA9098B873D}" type="datetimeFigureOut">
               <a:rPr lang="en-BE" smtClean="0"/>
-              <a:t>06/02/2025</a:t>
+              <a:t>07/02/2025</a:t>
             </a:fld>
             <a:endParaRPr lang="en-BE"/>
           </a:p>
@@ -6295,7 +6295,7 @@
           <a:p>
             <a:fld id="{A496BEFF-7D57-7742-81E9-2EA9098B873D}" type="datetimeFigureOut">
               <a:rPr lang="en-BE" smtClean="0"/>
-              <a:t>06/02/2025</a:t>
+              <a:t>07/02/2025</a:t>
             </a:fld>
             <a:endParaRPr lang="en-BE"/>
           </a:p>
@@ -23257,6 +23257,1772 @@
         <p:cNvPr id="1" name="">
           <a:extLst>
             <a:ext uri="{FF2B5EF4-FFF2-40B4-BE49-F238E27FC236}">
+              <a16:creationId xmlns:a16="http://schemas.microsoft.com/office/drawing/2014/main" id="{DE4AA7D3-2DC7-6DF1-4CD8-16FD6B79615F}"/>
+            </a:ext>
+          </a:extLst>
+        </p:cNvPr>
+        <p:cNvGrpSpPr/>
+        <p:nvPr/>
+      </p:nvGrpSpPr>
+      <p:grpSpPr>
+        <a:xfrm>
+          <a:off x="0" y="0"/>
+          <a:ext cx="0" cy="0"/>
+          <a:chOff x="0" y="0"/>
+          <a:chExt cx="0" cy="0"/>
+        </a:xfrm>
+      </p:grpSpPr>
+      <p:sp useBgFill="1">
+        <p:nvSpPr>
+          <p:cNvPr id="14" name="Rectangle 13">
+            <a:extLst>
+              <a:ext uri="{FF2B5EF4-FFF2-40B4-BE49-F238E27FC236}">
+                <a16:creationId xmlns:a16="http://schemas.microsoft.com/office/drawing/2014/main" id="{BA9AAC08-9171-8075-D826-334954A9053D}"/>
+              </a:ext>
+              <a:ext uri="{C183D7F6-B498-43B3-948B-1728B52AA6E4}">
+                <adec:decorative xmlns:adec="http://schemas.microsoft.com/office/drawing/2017/decorative" val="1"/>
+              </a:ext>
+            </a:extLst>
+          </p:cNvPr>
+          <p:cNvSpPr>
+            <a:spLocks noGrp="1" noRot="1" noChangeAspect="1" noMove="1" noResize="1" noEditPoints="1" noAdjustHandles="1" noChangeArrowheads="1" noChangeShapeType="1" noTextEdit="1"/>
+          </p:cNvSpPr>
+          <p:nvPr>
+            <p:extLst>
+              <p:ext uri="{386F3935-93C4-4BCD-93E2-E3B085C9AB24}">
+                <p16:designElem xmlns:p16="http://schemas.microsoft.com/office/powerpoint/2015/main" val="1"/>
+              </p:ext>
+            </p:extLst>
+          </p:nvPr>
+        </p:nvSpPr>
+        <p:spPr>
+          <a:xfrm>
+            <a:off x="0" y="0"/>
+            <a:ext cx="12192000" cy="6858000"/>
+          </a:xfrm>
+          <a:prstGeom prst="rect">
+            <a:avLst/>
+          </a:prstGeom>
+          <a:ln w="12700" cap="flat" cmpd="sng" algn="ctr">
+            <a:noFill/>
+            <a:prstDash val="solid"/>
+            <a:miter lim="800000"/>
+          </a:ln>
+          <a:effectLst/>
+        </p:spPr>
+        <p:style>
+          <a:lnRef idx="2">
+            <a:schemeClr val="accent1">
+              <a:shade val="50000"/>
+            </a:schemeClr>
+          </a:lnRef>
+          <a:fillRef idx="1">
+            <a:schemeClr val="accent1"/>
+          </a:fillRef>
+          <a:effectRef idx="0">
+            <a:schemeClr val="accent1"/>
+          </a:effectRef>
+          <a:fontRef idx="minor">
+            <a:schemeClr val="lt1"/>
+          </a:fontRef>
+        </p:style>
+        <p:txBody>
+          <a:bodyPr rtlCol="0" anchor="ctr"/>
+          <a:lstStyle/>
+          <a:p>
+            <a:pPr marL="0" marR="0" lvl="0" indent="0" algn="ctr" defTabSz="914400" rtl="0" eaLnBrk="1" fontAlgn="auto" latinLnBrk="0" hangingPunct="1">
+              <a:lnSpc>
+                <a:spcPct val="100000"/>
+              </a:lnSpc>
+              <a:spcBef>
+                <a:spcPts val="0"/>
+              </a:spcBef>
+              <a:spcAft>
+                <a:spcPts val="0"/>
+              </a:spcAft>
+              <a:buClrTx/>
+              <a:buSzTx/>
+              <a:buFontTx/>
+              <a:buNone/>
+              <a:tabLst/>
+              <a:defRPr/>
+            </a:pPr>
+            <a:endParaRPr kumimoji="0" lang="en-US" sz="1800" b="0" i="0" u="none" strike="noStrike" kern="1200" cap="none" spc="0" normalizeH="0" baseline="0" noProof="0">
+              <a:ln>
+                <a:noFill/>
+              </a:ln>
+              <a:solidFill>
+                <a:prstClr val="white"/>
+              </a:solidFill>
+              <a:effectLst/>
+              <a:uLnTx/>
+              <a:uFillTx/>
+              <a:latin typeface="Aptos" panose="02110004020202020204"/>
+              <a:ea typeface="+mn-ea"/>
+              <a:cs typeface="+mn-cs"/>
+            </a:endParaRPr>
+          </a:p>
+        </p:txBody>
+      </p:sp>
+      <p:sp>
+        <p:nvSpPr>
+          <p:cNvPr id="2" name="Title 1">
+            <a:extLst>
+              <a:ext uri="{FF2B5EF4-FFF2-40B4-BE49-F238E27FC236}">
+                <a16:creationId xmlns:a16="http://schemas.microsoft.com/office/drawing/2014/main" id="{CD26DBDF-FD32-0862-1250-309ECEDD5094}"/>
+              </a:ext>
+            </a:extLst>
+          </p:cNvPr>
+          <p:cNvSpPr>
+            <a:spLocks noGrp="1"/>
+          </p:cNvSpPr>
+          <p:nvPr>
+            <p:ph type="title"/>
+          </p:nvPr>
+        </p:nvSpPr>
+        <p:spPr>
+          <a:xfrm>
+            <a:off x="827088" y="1641752"/>
+            <a:ext cx="3527425" cy="4366936"/>
+          </a:xfrm>
+        </p:spPr>
+        <p:txBody>
+          <a:bodyPr anchor="t">
+            <a:normAutofit/>
+          </a:bodyPr>
+          <a:lstStyle/>
+          <a:p>
+            <a:r>
+              <a:rPr lang="en-GB" sz="4000" dirty="0"/>
+              <a:t>Arrays in C#</a:t>
+            </a:r>
+            <a:endParaRPr lang="en-BE" sz="4000" dirty="0"/>
+          </a:p>
+        </p:txBody>
+      </p:sp>
+      <p:sp>
+        <p:nvSpPr>
+          <p:cNvPr id="3" name="Content Placeholder 2">
+            <a:extLst>
+              <a:ext uri="{FF2B5EF4-FFF2-40B4-BE49-F238E27FC236}">
+                <a16:creationId xmlns:a16="http://schemas.microsoft.com/office/drawing/2014/main" id="{7D28C950-A547-813A-E564-B55E788950BE}"/>
+              </a:ext>
+            </a:extLst>
+          </p:cNvPr>
+          <p:cNvSpPr>
+            <a:spLocks noGrp="1"/>
+          </p:cNvSpPr>
+          <p:nvPr>
+            <p:ph idx="1"/>
+          </p:nvPr>
+        </p:nvSpPr>
+        <p:spPr>
+          <a:xfrm>
+            <a:off x="5222081" y="1641752"/>
+            <a:ext cx="5260975" cy="3960000"/>
+          </a:xfrm>
+        </p:spPr>
+        <p:txBody>
+          <a:bodyPr>
+            <a:normAutofit/>
+          </a:bodyPr>
+          <a:lstStyle/>
+          <a:p>
+            <a:r>
+              <a:rPr lang="en-GB" sz="2400" dirty="0">
+                <a:solidFill>
+                  <a:schemeClr val="tx1">
+                    <a:alpha val="80000"/>
+                  </a:schemeClr>
+                </a:solidFill>
+              </a:rPr>
+              <a:t>Why use arrays? Store multiple values</a:t>
+            </a:r>
+          </a:p>
+          <a:p>
+            <a:r>
+              <a:rPr lang="en-GB" sz="2400" dirty="0">
+                <a:solidFill>
+                  <a:schemeClr val="tx1">
+                    <a:alpha val="80000"/>
+                  </a:schemeClr>
+                </a:solidFill>
+              </a:rPr>
+              <a:t>Examples:</a:t>
+            </a:r>
+            <a:endParaRPr lang="en-BE" sz="2400" dirty="0">
+              <a:solidFill>
+                <a:schemeClr val="tx1">
+                  <a:alpha val="80000"/>
+                </a:schemeClr>
+              </a:solidFill>
+            </a:endParaRPr>
+          </a:p>
+        </p:txBody>
+      </p:sp>
+      <p:grpSp>
+        <p:nvGrpSpPr>
+          <p:cNvPr id="15" name="Group 14">
+            <a:extLst>
+              <a:ext uri="{FF2B5EF4-FFF2-40B4-BE49-F238E27FC236}">
+                <a16:creationId xmlns:a16="http://schemas.microsoft.com/office/drawing/2014/main" id="{1B83719A-E593-69FE-9A68-E058E369B0D9}"/>
+              </a:ext>
+              <a:ext uri="{C183D7F6-B498-43B3-948B-1728B52AA6E4}">
+                <adec:decorative xmlns:adec="http://schemas.microsoft.com/office/drawing/2017/decorative" val="1"/>
+              </a:ext>
+            </a:extLst>
+          </p:cNvPr>
+          <p:cNvGrpSpPr>
+            <a:grpSpLocks noGrp="1" noUngrp="1" noRot="1" noChangeAspect="1" noMove="1" noResize="1"/>
+          </p:cNvGrpSpPr>
+          <p:nvPr>
+            <p:extLst>
+              <p:ext uri="{386F3935-93C4-4BCD-93E2-E3B085C9AB24}">
+                <p16:designElem xmlns:p16="http://schemas.microsoft.com/office/powerpoint/2015/main" val="1"/>
+              </p:ext>
+            </p:extLst>
+          </p:nvPr>
+        </p:nvGrpSpPr>
+        <p:grpSpPr>
+          <a:xfrm>
+            <a:off x="11479015" y="0"/>
+            <a:ext cx="712985" cy="6858000"/>
+            <a:chOff x="11479015" y="0"/>
+            <a:chExt cx="712985" cy="6858000"/>
+          </a:xfrm>
+          <a:effectLst>
+            <a:outerShdw blurRad="381000" dist="152400" dir="10800000" algn="ctr" rotWithShape="0">
+              <a:schemeClr val="bg1">
+                <a:alpha val="10000"/>
+              </a:schemeClr>
+            </a:outerShdw>
+          </a:effectLst>
+        </p:grpSpPr>
+        <p:sp>
+          <p:nvSpPr>
+            <p:cNvPr id="11" name="Freeform: Shape 10">
+              <a:extLst>
+                <a:ext uri="{FF2B5EF4-FFF2-40B4-BE49-F238E27FC236}">
+                  <a16:creationId xmlns:a16="http://schemas.microsoft.com/office/drawing/2014/main" id="{22494A31-6C5F-A8C8-6942-186A3D9F42D9}"/>
+                </a:ext>
+                <a:ext uri="{C183D7F6-B498-43B3-948B-1728B52AA6E4}">
+                  <adec:decorative xmlns:adec="http://schemas.microsoft.com/office/drawing/2017/decorative" val="1"/>
+                </a:ext>
+              </a:extLst>
+            </p:cNvPr>
+            <p:cNvSpPr/>
+            <p:nvPr>
+              <p:extLst>
+                <p:ext uri="{386F3935-93C4-4BCD-93E2-E3B085C9AB24}">
+                  <p16:designElem xmlns:p16="http://schemas.microsoft.com/office/powerpoint/2015/main" val="1"/>
+                </p:ext>
+              </p:extLst>
+            </p:nvPr>
+          </p:nvSpPr>
+          <p:spPr>
+            <a:xfrm>
+              <a:off x="11479018" y="0"/>
+              <a:ext cx="712982" cy="6858000"/>
+            </a:xfrm>
+            <a:custGeom>
+              <a:avLst/>
+              <a:gdLst>
+                <a:gd name="connsiteX0" fmla="*/ 280560 w 712982"/>
+                <a:gd name="connsiteY0" fmla="*/ 0 h 6858000"/>
+                <a:gd name="connsiteX1" fmla="*/ 712982 w 712982"/>
+                <a:gd name="connsiteY1" fmla="*/ 0 h 6858000"/>
+                <a:gd name="connsiteX2" fmla="*/ 712982 w 712982"/>
+                <a:gd name="connsiteY2" fmla="*/ 6858000 h 6858000"/>
+                <a:gd name="connsiteX3" fmla="*/ 372527 w 712982"/>
+                <a:gd name="connsiteY3" fmla="*/ 6858000 h 6858000"/>
+                <a:gd name="connsiteX4" fmla="*/ 372901 w 712982"/>
+                <a:gd name="connsiteY4" fmla="*/ 6835810 h 6858000"/>
+                <a:gd name="connsiteX5" fmla="*/ 363017 w 712982"/>
+                <a:gd name="connsiteY5" fmla="*/ 6518145 h 6858000"/>
+                <a:gd name="connsiteX6" fmla="*/ 310498 w 712982"/>
+                <a:gd name="connsiteY6" fmla="*/ 6393936 h 6858000"/>
+                <a:gd name="connsiteX7" fmla="*/ 305420 w 712982"/>
+                <a:gd name="connsiteY7" fmla="*/ 6355564 h 6858000"/>
+                <a:gd name="connsiteX8" fmla="*/ 311030 w 712982"/>
+                <a:gd name="connsiteY8" fmla="*/ 6267729 h 6858000"/>
+                <a:gd name="connsiteX9" fmla="*/ 281440 w 712982"/>
+                <a:gd name="connsiteY9" fmla="*/ 6090959 h 6858000"/>
+                <a:gd name="connsiteX10" fmla="*/ 258928 w 712982"/>
+                <a:gd name="connsiteY10" fmla="*/ 6026981 h 6858000"/>
+                <a:gd name="connsiteX11" fmla="*/ 245105 w 712982"/>
+                <a:gd name="connsiteY11" fmla="*/ 5991615 h 6858000"/>
+                <a:gd name="connsiteX12" fmla="*/ 197441 w 712982"/>
+                <a:gd name="connsiteY12" fmla="*/ 5807458 h 6858000"/>
+                <a:gd name="connsiteX13" fmla="*/ 159115 w 712982"/>
+                <a:gd name="connsiteY13" fmla="*/ 5727356 h 6858000"/>
+                <a:gd name="connsiteX14" fmla="*/ 152306 w 712982"/>
+                <a:gd name="connsiteY14" fmla="*/ 5705270 h 6858000"/>
+                <a:gd name="connsiteX15" fmla="*/ 150939 w 712982"/>
+                <a:gd name="connsiteY15" fmla="*/ 5580441 h 6858000"/>
+                <a:gd name="connsiteX16" fmla="*/ 187956 w 712982"/>
+                <a:gd name="connsiteY16" fmla="*/ 5482729 h 6858000"/>
+                <a:gd name="connsiteX17" fmla="*/ 201902 w 712982"/>
+                <a:gd name="connsiteY17" fmla="*/ 5463053 h 6858000"/>
+                <a:gd name="connsiteX18" fmla="*/ 168174 w 712982"/>
+                <a:gd name="connsiteY18" fmla="*/ 5205662 h 6858000"/>
+                <a:gd name="connsiteX19" fmla="*/ 157186 w 712982"/>
+                <a:gd name="connsiteY19" fmla="*/ 5166766 h 6858000"/>
+                <a:gd name="connsiteX20" fmla="*/ 163999 w 712982"/>
+                <a:gd name="connsiteY20" fmla="*/ 4972256 h 6858000"/>
+                <a:gd name="connsiteX21" fmla="*/ 163388 w 712982"/>
+                <a:gd name="connsiteY21" fmla="*/ 4915833 h 6858000"/>
+                <a:gd name="connsiteX22" fmla="*/ 166361 w 712982"/>
+                <a:gd name="connsiteY22" fmla="*/ 4712964 h 6858000"/>
+                <a:gd name="connsiteX23" fmla="*/ 140122 w 712982"/>
+                <a:gd name="connsiteY23" fmla="*/ 4687152 h 6858000"/>
+                <a:gd name="connsiteX24" fmla="*/ 73058 w 712982"/>
+                <a:gd name="connsiteY24" fmla="*/ 4611951 h 6858000"/>
+                <a:gd name="connsiteX25" fmla="*/ 3979 w 712982"/>
+                <a:gd name="connsiteY25" fmla="*/ 4456771 h 6858000"/>
+                <a:gd name="connsiteX26" fmla="*/ 2091 w 712982"/>
+                <a:gd name="connsiteY26" fmla="*/ 4412781 h 6858000"/>
+                <a:gd name="connsiteX27" fmla="*/ 75905 w 712982"/>
+                <a:gd name="connsiteY27" fmla="*/ 4292897 h 6858000"/>
+                <a:gd name="connsiteX28" fmla="*/ 104434 w 712982"/>
+                <a:gd name="connsiteY28" fmla="*/ 4235333 h 6858000"/>
+                <a:gd name="connsiteX29" fmla="*/ 151065 w 712982"/>
+                <a:gd name="connsiteY29" fmla="*/ 4075686 h 6858000"/>
+                <a:gd name="connsiteX30" fmla="*/ 161243 w 712982"/>
+                <a:gd name="connsiteY30" fmla="*/ 4061695 h 6858000"/>
+                <a:gd name="connsiteX31" fmla="*/ 286285 w 712982"/>
+                <a:gd name="connsiteY31" fmla="*/ 3933862 h 6858000"/>
+                <a:gd name="connsiteX32" fmla="*/ 306926 w 712982"/>
+                <a:gd name="connsiteY32" fmla="*/ 3905847 h 6858000"/>
+                <a:gd name="connsiteX33" fmla="*/ 340015 w 712982"/>
+                <a:gd name="connsiteY33" fmla="*/ 3871199 h 6858000"/>
+                <a:gd name="connsiteX34" fmla="*/ 400111 w 712982"/>
+                <a:gd name="connsiteY34" fmla="*/ 3767743 h 6858000"/>
+                <a:gd name="connsiteX35" fmla="*/ 409694 w 712982"/>
+                <a:gd name="connsiteY35" fmla="*/ 3646690 h 6858000"/>
+                <a:gd name="connsiteX36" fmla="*/ 428447 w 712982"/>
+                <a:gd name="connsiteY36" fmla="*/ 3499752 h 6858000"/>
+                <a:gd name="connsiteX37" fmla="*/ 445033 w 712982"/>
+                <a:gd name="connsiteY37" fmla="*/ 3437349 h 6858000"/>
+                <a:gd name="connsiteX38" fmla="*/ 471431 w 712982"/>
+                <a:gd name="connsiteY38" fmla="*/ 3272018 h 6858000"/>
+                <a:gd name="connsiteX39" fmla="*/ 495919 w 712982"/>
+                <a:gd name="connsiteY39" fmla="*/ 3153432 h 6858000"/>
+                <a:gd name="connsiteX40" fmla="*/ 499541 w 712982"/>
+                <a:gd name="connsiteY40" fmla="*/ 2985907 h 6858000"/>
+                <a:gd name="connsiteX41" fmla="*/ 491640 w 712982"/>
+                <a:gd name="connsiteY41" fmla="*/ 2905697 h 6858000"/>
+                <a:gd name="connsiteX42" fmla="*/ 586592 w 712982"/>
+                <a:gd name="connsiteY42" fmla="*/ 2746325 h 6858000"/>
+                <a:gd name="connsiteX43" fmla="*/ 647211 w 712982"/>
+                <a:gd name="connsiteY43" fmla="*/ 2620857 h 6858000"/>
+                <a:gd name="connsiteX44" fmla="*/ 598120 w 712982"/>
+                <a:gd name="connsiteY44" fmla="*/ 2501248 h 6858000"/>
+                <a:gd name="connsiteX45" fmla="*/ 560897 w 712982"/>
+                <a:gd name="connsiteY45" fmla="*/ 2471368 h 6858000"/>
+                <a:gd name="connsiteX46" fmla="*/ 506928 w 712982"/>
+                <a:gd name="connsiteY46" fmla="*/ 2272389 h 6858000"/>
+                <a:gd name="connsiteX47" fmla="*/ 474122 w 712982"/>
+                <a:gd name="connsiteY47" fmla="*/ 1983284 h 6858000"/>
+                <a:gd name="connsiteX48" fmla="*/ 349180 w 712982"/>
+                <a:gd name="connsiteY48" fmla="*/ 1510207 h 6858000"/>
+                <a:gd name="connsiteX49" fmla="*/ 306451 w 712982"/>
+                <a:gd name="connsiteY49" fmla="*/ 1430003 h 6858000"/>
+                <a:gd name="connsiteX50" fmla="*/ 287747 w 712982"/>
+                <a:gd name="connsiteY50" fmla="*/ 1336633 h 6858000"/>
+                <a:gd name="connsiteX51" fmla="*/ 304326 w 712982"/>
+                <a:gd name="connsiteY51" fmla="*/ 1298229 h 6858000"/>
+                <a:gd name="connsiteX52" fmla="*/ 317671 w 712982"/>
+                <a:gd name="connsiteY52" fmla="*/ 1136667 h 6858000"/>
+                <a:gd name="connsiteX53" fmla="*/ 314959 w 712982"/>
+                <a:gd name="connsiteY53" fmla="*/ 1106522 h 6858000"/>
+                <a:gd name="connsiteX54" fmla="*/ 290675 w 712982"/>
+                <a:gd name="connsiteY54" fmla="*/ 1004980 h 6858000"/>
+                <a:gd name="connsiteX55" fmla="*/ 272712 w 712982"/>
+                <a:gd name="connsiteY55" fmla="*/ 910357 h 6858000"/>
+                <a:gd name="connsiteX56" fmla="*/ 270963 w 712982"/>
+                <a:gd name="connsiteY56" fmla="*/ 667028 h 6858000"/>
+                <a:gd name="connsiteX57" fmla="*/ 244986 w 712982"/>
+                <a:gd name="connsiteY57" fmla="*/ 483131 h 6858000"/>
+                <a:gd name="connsiteX58" fmla="*/ 241465 w 712982"/>
+                <a:gd name="connsiteY58" fmla="*/ 397465 h 6858000"/>
+                <a:gd name="connsiteX59" fmla="*/ 244890 w 712982"/>
+                <a:gd name="connsiteY59" fmla="*/ 348507 h 6858000"/>
+                <a:gd name="connsiteX60" fmla="*/ 293439 w 712982"/>
+                <a:gd name="connsiteY60" fmla="*/ 233141 h 6858000"/>
+                <a:gd name="connsiteX61" fmla="*/ 300513 w 712982"/>
+                <a:gd name="connsiteY61" fmla="*/ 172069 h 6858000"/>
+              </a:gdLst>
+              <a:ahLst/>
+              <a:cxnLst>
+                <a:cxn ang="0">
+                  <a:pos x="connsiteX0" y="connsiteY0"/>
+                </a:cxn>
+                <a:cxn ang="0">
+                  <a:pos x="connsiteX1" y="connsiteY1"/>
+                </a:cxn>
+                <a:cxn ang="0">
+                  <a:pos x="connsiteX2" y="connsiteY2"/>
+                </a:cxn>
+                <a:cxn ang="0">
+                  <a:pos x="connsiteX3" y="connsiteY3"/>
+                </a:cxn>
+                <a:cxn ang="0">
+                  <a:pos x="connsiteX4" y="connsiteY4"/>
+                </a:cxn>
+                <a:cxn ang="0">
+                  <a:pos x="connsiteX5" y="connsiteY5"/>
+                </a:cxn>
+                <a:cxn ang="0">
+                  <a:pos x="connsiteX6" y="connsiteY6"/>
+                </a:cxn>
+                <a:cxn ang="0">
+                  <a:pos x="connsiteX7" y="connsiteY7"/>
+                </a:cxn>
+                <a:cxn ang="0">
+                  <a:pos x="connsiteX8" y="connsiteY8"/>
+                </a:cxn>
+                <a:cxn ang="0">
+                  <a:pos x="connsiteX9" y="connsiteY9"/>
+                </a:cxn>
+                <a:cxn ang="0">
+                  <a:pos x="connsiteX10" y="connsiteY10"/>
+                </a:cxn>
+                <a:cxn ang="0">
+                  <a:pos x="connsiteX11" y="connsiteY11"/>
+                </a:cxn>
+                <a:cxn ang="0">
+                  <a:pos x="connsiteX12" y="connsiteY12"/>
+                </a:cxn>
+                <a:cxn ang="0">
+                  <a:pos x="connsiteX13" y="connsiteY13"/>
+                </a:cxn>
+                <a:cxn ang="0">
+                  <a:pos x="connsiteX14" y="connsiteY14"/>
+                </a:cxn>
+                <a:cxn ang="0">
+                  <a:pos x="connsiteX15" y="connsiteY15"/>
+                </a:cxn>
+                <a:cxn ang="0">
+                  <a:pos x="connsiteX16" y="connsiteY16"/>
+                </a:cxn>
+                <a:cxn ang="0">
+                  <a:pos x="connsiteX17" y="connsiteY17"/>
+                </a:cxn>
+                <a:cxn ang="0">
+                  <a:pos x="connsiteX18" y="connsiteY18"/>
+                </a:cxn>
+                <a:cxn ang="0">
+                  <a:pos x="connsiteX19" y="connsiteY19"/>
+                </a:cxn>
+                <a:cxn ang="0">
+                  <a:pos x="connsiteX20" y="connsiteY20"/>
+                </a:cxn>
+                <a:cxn ang="0">
+                  <a:pos x="connsiteX21" y="connsiteY21"/>
+                </a:cxn>
+                <a:cxn ang="0">
+                  <a:pos x="connsiteX22" y="connsiteY22"/>
+                </a:cxn>
+                <a:cxn ang="0">
+                  <a:pos x="connsiteX23" y="connsiteY23"/>
+                </a:cxn>
+                <a:cxn ang="0">
+                  <a:pos x="connsiteX24" y="connsiteY24"/>
+                </a:cxn>
+                <a:cxn ang="0">
+                  <a:pos x="connsiteX25" y="connsiteY25"/>
+                </a:cxn>
+                <a:cxn ang="0">
+                  <a:pos x="connsiteX26" y="connsiteY26"/>
+                </a:cxn>
+                <a:cxn ang="0">
+                  <a:pos x="connsiteX27" y="connsiteY27"/>
+                </a:cxn>
+                <a:cxn ang="0">
+                  <a:pos x="connsiteX28" y="connsiteY28"/>
+                </a:cxn>
+                <a:cxn ang="0">
+                  <a:pos x="connsiteX29" y="connsiteY29"/>
+                </a:cxn>
+                <a:cxn ang="0">
+                  <a:pos x="connsiteX30" y="connsiteY30"/>
+                </a:cxn>
+                <a:cxn ang="0">
+                  <a:pos x="connsiteX31" y="connsiteY31"/>
+                </a:cxn>
+                <a:cxn ang="0">
+                  <a:pos x="connsiteX32" y="connsiteY32"/>
+                </a:cxn>
+                <a:cxn ang="0">
+                  <a:pos x="connsiteX33" y="connsiteY33"/>
+                </a:cxn>
+                <a:cxn ang="0">
+                  <a:pos x="connsiteX34" y="connsiteY34"/>
+                </a:cxn>
+                <a:cxn ang="0">
+                  <a:pos x="connsiteX35" y="connsiteY35"/>
+                </a:cxn>
+                <a:cxn ang="0">
+                  <a:pos x="connsiteX36" y="connsiteY36"/>
+                </a:cxn>
+                <a:cxn ang="0">
+                  <a:pos x="connsiteX37" y="connsiteY37"/>
+                </a:cxn>
+                <a:cxn ang="0">
+                  <a:pos x="connsiteX38" y="connsiteY38"/>
+                </a:cxn>
+                <a:cxn ang="0">
+                  <a:pos x="connsiteX39" y="connsiteY39"/>
+                </a:cxn>
+                <a:cxn ang="0">
+                  <a:pos x="connsiteX40" y="connsiteY40"/>
+                </a:cxn>
+                <a:cxn ang="0">
+                  <a:pos x="connsiteX41" y="connsiteY41"/>
+                </a:cxn>
+                <a:cxn ang="0">
+                  <a:pos x="connsiteX42" y="connsiteY42"/>
+                </a:cxn>
+                <a:cxn ang="0">
+                  <a:pos x="connsiteX43" y="connsiteY43"/>
+                </a:cxn>
+                <a:cxn ang="0">
+                  <a:pos x="connsiteX44" y="connsiteY44"/>
+                </a:cxn>
+                <a:cxn ang="0">
+                  <a:pos x="connsiteX45" y="connsiteY45"/>
+                </a:cxn>
+                <a:cxn ang="0">
+                  <a:pos x="connsiteX46" y="connsiteY46"/>
+                </a:cxn>
+                <a:cxn ang="0">
+                  <a:pos x="connsiteX47" y="connsiteY47"/>
+                </a:cxn>
+                <a:cxn ang="0">
+                  <a:pos x="connsiteX48" y="connsiteY48"/>
+                </a:cxn>
+                <a:cxn ang="0">
+                  <a:pos x="connsiteX49" y="connsiteY49"/>
+                </a:cxn>
+                <a:cxn ang="0">
+                  <a:pos x="connsiteX50" y="connsiteY50"/>
+                </a:cxn>
+                <a:cxn ang="0">
+                  <a:pos x="connsiteX51" y="connsiteY51"/>
+                </a:cxn>
+                <a:cxn ang="0">
+                  <a:pos x="connsiteX52" y="connsiteY52"/>
+                </a:cxn>
+                <a:cxn ang="0">
+                  <a:pos x="connsiteX53" y="connsiteY53"/>
+                </a:cxn>
+                <a:cxn ang="0">
+                  <a:pos x="connsiteX54" y="connsiteY54"/>
+                </a:cxn>
+                <a:cxn ang="0">
+                  <a:pos x="connsiteX55" y="connsiteY55"/>
+                </a:cxn>
+                <a:cxn ang="0">
+                  <a:pos x="connsiteX56" y="connsiteY56"/>
+                </a:cxn>
+                <a:cxn ang="0">
+                  <a:pos x="connsiteX57" y="connsiteY57"/>
+                </a:cxn>
+                <a:cxn ang="0">
+                  <a:pos x="connsiteX58" y="connsiteY58"/>
+                </a:cxn>
+                <a:cxn ang="0">
+                  <a:pos x="connsiteX59" y="connsiteY59"/>
+                </a:cxn>
+                <a:cxn ang="0">
+                  <a:pos x="connsiteX60" y="connsiteY60"/>
+                </a:cxn>
+                <a:cxn ang="0">
+                  <a:pos x="connsiteX61" y="connsiteY61"/>
+                </a:cxn>
+              </a:cxnLst>
+              <a:rect l="l" t="t" r="r" b="b"/>
+              <a:pathLst>
+                <a:path w="712982" h="6858000">
+                  <a:moveTo>
+                    <a:pt x="280560" y="0"/>
+                  </a:moveTo>
+                  <a:lnTo>
+                    <a:pt x="712982" y="0"/>
+                  </a:lnTo>
+                  <a:lnTo>
+                    <a:pt x="712982" y="6858000"/>
+                  </a:lnTo>
+                  <a:lnTo>
+                    <a:pt x="372527" y="6858000"/>
+                  </a:lnTo>
+                  <a:lnTo>
+                    <a:pt x="372901" y="6835810"/>
+                  </a:lnTo>
+                  <a:cubicBezTo>
+                    <a:pt x="343741" y="6729822"/>
+                    <a:pt x="373381" y="6623551"/>
+                    <a:pt x="363017" y="6518145"/>
+                  </a:cubicBezTo>
+                  <a:cubicBezTo>
+                    <a:pt x="358372" y="6470360"/>
+                    <a:pt x="362468" y="6422202"/>
+                    <a:pt x="310498" y="6393936"/>
+                  </a:cubicBezTo>
+                  <a:cubicBezTo>
+                    <a:pt x="303659" y="6390296"/>
+                    <a:pt x="304819" y="6368800"/>
+                    <a:pt x="305420" y="6355564"/>
+                  </a:cubicBezTo>
+                  <a:cubicBezTo>
+                    <a:pt x="306594" y="6326166"/>
+                    <a:pt x="314451" y="6296329"/>
+                    <a:pt x="311030" y="6267729"/>
+                  </a:cubicBezTo>
+                  <a:cubicBezTo>
+                    <a:pt x="304253" y="6208466"/>
+                    <a:pt x="293104" y="6149393"/>
+                    <a:pt x="281440" y="6090959"/>
+                  </a:cubicBezTo>
+                  <a:cubicBezTo>
+                    <a:pt x="276978" y="6068911"/>
+                    <a:pt x="266829" y="6048361"/>
+                    <a:pt x="258928" y="6026981"/>
+                  </a:cubicBezTo>
+                  <a:cubicBezTo>
+                    <a:pt x="254416" y="6015184"/>
+                    <a:pt x="244605" y="6003083"/>
+                    <a:pt x="245105" y="5991615"/>
+                  </a:cubicBezTo>
+                  <a:cubicBezTo>
+                    <a:pt x="248075" y="5925141"/>
+                    <a:pt x="216651" y="5867990"/>
+                    <a:pt x="197441" y="5807458"/>
+                  </a:cubicBezTo>
+                  <a:cubicBezTo>
+                    <a:pt x="188523" y="5779456"/>
+                    <a:pt x="171697" y="5754078"/>
+                    <a:pt x="159115" y="5727356"/>
+                  </a:cubicBezTo>
+                  <a:cubicBezTo>
+                    <a:pt x="155717" y="5720411"/>
+                    <a:pt x="152517" y="5712566"/>
+                    <a:pt x="152306" y="5705270"/>
+                  </a:cubicBezTo>
+                  <a:cubicBezTo>
+                    <a:pt x="151252" y="5663532"/>
+                    <a:pt x="151674" y="5621922"/>
+                    <a:pt x="150939" y="5580441"/>
+                  </a:cubicBezTo>
+                  <a:cubicBezTo>
+                    <a:pt x="150326" y="5542748"/>
+                    <a:pt x="147369" y="5505023"/>
+                    <a:pt x="187956" y="5482729"/>
+                  </a:cubicBezTo>
+                  <a:cubicBezTo>
+                    <a:pt x="194324" y="5479395"/>
+                    <a:pt x="198291" y="5470181"/>
+                    <a:pt x="201902" y="5463053"/>
+                  </a:cubicBezTo>
+                  <a:cubicBezTo>
+                    <a:pt x="257480" y="5353065"/>
+                    <a:pt x="249730" y="5298303"/>
+                    <a:pt x="168174" y="5205662"/>
+                  </a:cubicBezTo>
+                  <a:cubicBezTo>
+                    <a:pt x="159805" y="5196040"/>
+                    <a:pt x="152161" y="5174340"/>
+                    <a:pt x="157186" y="5166766"/>
+                  </a:cubicBezTo>
+                  <a:cubicBezTo>
+                    <a:pt x="198743" y="5102508"/>
+                    <a:pt x="186477" y="5038579"/>
+                    <a:pt x="163999" y="4972256"/>
+                  </a:cubicBezTo>
+                  <a:cubicBezTo>
+                    <a:pt x="158020" y="4955056"/>
+                    <a:pt x="155299" y="4930181"/>
+                    <a:pt x="163388" y="4915833"/>
+                  </a:cubicBezTo>
+                  <a:cubicBezTo>
+                    <a:pt x="200708" y="4847649"/>
+                    <a:pt x="186907" y="4780374"/>
+                    <a:pt x="166361" y="4712964"/>
+                  </a:cubicBezTo>
+                  <a:cubicBezTo>
+                    <a:pt x="163165" y="4702485"/>
+                    <a:pt x="150748" y="4690669"/>
+                    <a:pt x="140122" y="4687152"/>
+                  </a:cubicBezTo>
+                  <a:cubicBezTo>
+                    <a:pt x="102452" y="4674589"/>
+                    <a:pt x="86917" y="4644970"/>
+                    <a:pt x="73058" y="4611951"/>
+                  </a:cubicBezTo>
+                  <a:cubicBezTo>
+                    <a:pt x="50686" y="4559957"/>
+                    <a:pt x="25516" y="4509149"/>
+                    <a:pt x="3979" y="4456771"/>
+                  </a:cubicBezTo>
+                  <a:cubicBezTo>
+                    <a:pt x="-1236" y="4443877"/>
+                    <a:pt x="-726" y="4427139"/>
+                    <a:pt x="2091" y="4412781"/>
+                  </a:cubicBezTo>
+                  <a:cubicBezTo>
+                    <a:pt x="11653" y="4363733"/>
+                    <a:pt x="45382" y="4329603"/>
+                    <a:pt x="75905" y="4292897"/>
+                  </a:cubicBezTo>
+                  <a:cubicBezTo>
+                    <a:pt x="89361" y="4276787"/>
+                    <a:pt x="97880" y="4255660"/>
+                    <a:pt x="104434" y="4235333"/>
+                  </a:cubicBezTo>
+                  <a:cubicBezTo>
+                    <a:pt x="121200" y="4182569"/>
+                    <a:pt x="135523" y="4128901"/>
+                    <a:pt x="151065" y="4075686"/>
+                  </a:cubicBezTo>
+                  <a:cubicBezTo>
+                    <a:pt x="152552" y="4070549"/>
+                    <a:pt x="157315" y="4065932"/>
+                    <a:pt x="161243" y="4061695"/>
+                  </a:cubicBezTo>
+                  <a:cubicBezTo>
+                    <a:pt x="202828" y="4019095"/>
+                    <a:pt x="244731" y="3976753"/>
+                    <a:pt x="286285" y="3933862"/>
+                  </a:cubicBezTo>
+                  <a:cubicBezTo>
+                    <a:pt x="294168" y="3925683"/>
+                    <a:pt x="299393" y="3914571"/>
+                    <a:pt x="306926" y="3905847"/>
+                  </a:cubicBezTo>
+                  <a:cubicBezTo>
+                    <a:pt x="317292" y="3893589"/>
+                    <a:pt x="326766" y="3878502"/>
+                    <a:pt x="340015" y="3871199"/>
+                  </a:cubicBezTo>
+                  <a:cubicBezTo>
+                    <a:pt x="381725" y="3848490"/>
+                    <a:pt x="396760" y="3812013"/>
+                    <a:pt x="400111" y="3767743"/>
+                  </a:cubicBezTo>
+                  <a:cubicBezTo>
+                    <a:pt x="403294" y="3727294"/>
+                    <a:pt x="405323" y="3686973"/>
+                    <a:pt x="409694" y="3646690"/>
+                  </a:cubicBezTo>
+                  <a:cubicBezTo>
+                    <a:pt x="414852" y="3597538"/>
+                    <a:pt x="420910" y="3548579"/>
+                    <a:pt x="428447" y="3499752"/>
+                  </a:cubicBezTo>
+                  <a:cubicBezTo>
+                    <a:pt x="431696" y="3478619"/>
+                    <a:pt x="435683" y="3456228"/>
+                    <a:pt x="445033" y="3437349"/>
+                  </a:cubicBezTo>
+                  <a:cubicBezTo>
+                    <a:pt x="470858" y="3384475"/>
+                    <a:pt x="486179" y="3329236"/>
+                    <a:pt x="471431" y="3272018"/>
+                  </a:cubicBezTo>
+                  <a:cubicBezTo>
+                    <a:pt x="459682" y="3226180"/>
+                    <a:pt x="472474" y="3185267"/>
+                    <a:pt x="495919" y="3153432"/>
+                  </a:cubicBezTo>
+                  <a:cubicBezTo>
+                    <a:pt x="538461" y="3095505"/>
+                    <a:pt x="521296" y="3040311"/>
+                    <a:pt x="499541" y="2985907"/>
+                  </a:cubicBezTo>
+                  <a:cubicBezTo>
+                    <a:pt x="488276" y="2957871"/>
+                    <a:pt x="486838" y="2934028"/>
+                    <a:pt x="491640" y="2905697"/>
+                  </a:cubicBezTo>
+                  <a:cubicBezTo>
+                    <a:pt x="502898" y="2840071"/>
+                    <a:pt x="547705" y="2792141"/>
+                    <a:pt x="586592" y="2746325"/>
+                  </a:cubicBezTo>
+                  <a:cubicBezTo>
+                    <a:pt x="619786" y="2707275"/>
+                    <a:pt x="636305" y="2665661"/>
+                    <a:pt x="647211" y="2620857"/>
+                  </a:cubicBezTo>
+                  <a:cubicBezTo>
+                    <a:pt x="661216" y="2564298"/>
+                    <a:pt x="648982" y="2522027"/>
+                    <a:pt x="598120" y="2501248"/>
+                  </a:cubicBezTo>
+                  <a:cubicBezTo>
+                    <a:pt x="583733" y="2495506"/>
+                    <a:pt x="566431" y="2484521"/>
+                    <a:pt x="560897" y="2471368"/>
+                  </a:cubicBezTo>
+                  <a:cubicBezTo>
+                    <a:pt x="533469" y="2407931"/>
+                    <a:pt x="496686" y="2344634"/>
+                    <a:pt x="506928" y="2272389"/>
+                  </a:cubicBezTo>
+                  <a:cubicBezTo>
+                    <a:pt x="520879" y="2172517"/>
+                    <a:pt x="509052" y="2077807"/>
+                    <a:pt x="474122" y="1983284"/>
+                  </a:cubicBezTo>
+                  <a:cubicBezTo>
+                    <a:pt x="417537" y="1829959"/>
+                    <a:pt x="358639" y="1676886"/>
+                    <a:pt x="349180" y="1510207"/>
+                  </a:cubicBezTo>
+                  <a:cubicBezTo>
+                    <a:pt x="347619" y="1482573"/>
+                    <a:pt x="326399" y="1451821"/>
+                    <a:pt x="306451" y="1430003"/>
+                  </a:cubicBezTo>
+                  <a:cubicBezTo>
+                    <a:pt x="268511" y="1388202"/>
+                    <a:pt x="266127" y="1390512"/>
+                    <a:pt x="287747" y="1336633"/>
+                  </a:cubicBezTo>
+                  <a:cubicBezTo>
+                    <a:pt x="293070" y="1323756"/>
+                    <a:pt x="295470" y="1308272"/>
+                    <a:pt x="304326" y="1298229"/>
+                  </a:cubicBezTo>
+                  <a:cubicBezTo>
+                    <a:pt x="349361" y="1247057"/>
+                    <a:pt x="331041" y="1191986"/>
+                    <a:pt x="317671" y="1136667"/>
+                  </a:cubicBezTo>
+                  <a:cubicBezTo>
+                    <a:pt x="315148" y="1126990"/>
+                    <a:pt x="311827" y="1115354"/>
+                    <a:pt x="314959" y="1106522"/>
+                  </a:cubicBezTo>
+                  <a:cubicBezTo>
+                    <a:pt x="329032" y="1066641"/>
+                    <a:pt x="319157" y="1035231"/>
+                    <a:pt x="290675" y="1004980"/>
+                  </a:cubicBezTo>
+                  <a:cubicBezTo>
+                    <a:pt x="266138" y="978690"/>
+                    <a:pt x="249805" y="947108"/>
+                    <a:pt x="272712" y="910357"/>
+                  </a:cubicBezTo>
+                  <a:cubicBezTo>
+                    <a:pt x="323486" y="828702"/>
+                    <a:pt x="317578" y="747981"/>
+                    <a:pt x="270963" y="667028"/>
+                  </a:cubicBezTo>
+                  <a:cubicBezTo>
+                    <a:pt x="237707" y="609204"/>
+                    <a:pt x="225082" y="549995"/>
+                    <a:pt x="244986" y="483131"/>
+                  </a:cubicBezTo>
+                  <a:cubicBezTo>
+                    <a:pt x="252708" y="457408"/>
+                    <a:pt x="242285" y="426353"/>
+                    <a:pt x="241465" y="397465"/>
+                  </a:cubicBezTo>
+                  <a:cubicBezTo>
+                    <a:pt x="240850" y="381142"/>
+                    <a:pt x="239176" y="363176"/>
+                    <a:pt x="244890" y="348507"/>
+                  </a:cubicBezTo>
+                  <a:cubicBezTo>
+                    <a:pt x="259350" y="309454"/>
+                    <a:pt x="279299" y="272445"/>
+                    <a:pt x="293439" y="233141"/>
+                  </a:cubicBezTo>
+                  <a:cubicBezTo>
+                    <a:pt x="300152" y="214256"/>
+                    <a:pt x="302437" y="192349"/>
+                    <a:pt x="300513" y="172069"/>
+                  </a:cubicBezTo>
+                  <a:close/>
+                </a:path>
+              </a:pathLst>
+            </a:custGeom>
+            <a:solidFill>
+              <a:srgbClr val="FFFFFF"/>
+            </a:solidFill>
+            <a:ln w="12700" cap="flat" cmpd="sng" algn="ctr">
+              <a:noFill/>
+              <a:prstDash val="solid"/>
+              <a:miter lim="800000"/>
+            </a:ln>
+            <a:effectLst/>
+          </p:spPr>
+          <p:style>
+            <a:lnRef idx="2">
+              <a:schemeClr val="accent1">
+                <a:shade val="50000"/>
+              </a:schemeClr>
+            </a:lnRef>
+            <a:fillRef idx="1">
+              <a:schemeClr val="accent1"/>
+            </a:fillRef>
+            <a:effectRef idx="0">
+              <a:schemeClr val="accent1"/>
+            </a:effectRef>
+            <a:fontRef idx="minor">
+              <a:schemeClr val="lt1"/>
+            </a:fontRef>
+          </p:style>
+          <p:txBody>
+            <a:bodyPr wrap="square" rtlCol="0" anchor="ctr">
+              <a:noAutofit/>
+            </a:bodyPr>
+            <a:lstStyle/>
+            <a:p>
+              <a:pPr marL="0" marR="0" lvl="0" indent="0" algn="ctr" defTabSz="914400" rtl="0" eaLnBrk="1" fontAlgn="auto" latinLnBrk="0" hangingPunct="1">
+                <a:lnSpc>
+                  <a:spcPct val="100000"/>
+                </a:lnSpc>
+                <a:spcBef>
+                  <a:spcPts val="0"/>
+                </a:spcBef>
+                <a:spcAft>
+                  <a:spcPts val="0"/>
+                </a:spcAft>
+                <a:buClrTx/>
+                <a:buSzTx/>
+                <a:buFontTx/>
+                <a:buNone/>
+                <a:tabLst/>
+                <a:defRPr/>
+              </a:pPr>
+              <a:endParaRPr kumimoji="0" lang="en-US" sz="1800" b="0" i="0" u="none" strike="noStrike" kern="1200" cap="none" spc="0" normalizeH="0" baseline="0" noProof="0">
+                <a:ln>
+                  <a:noFill/>
+                </a:ln>
+                <a:solidFill>
+                  <a:prstClr val="white"/>
+                </a:solidFill>
+                <a:effectLst/>
+                <a:uLnTx/>
+                <a:uFillTx/>
+                <a:latin typeface="Aptos" panose="02110004020202020204"/>
+                <a:ea typeface="+mn-ea"/>
+                <a:cs typeface="+mn-cs"/>
+              </a:endParaRPr>
+            </a:p>
+          </p:txBody>
+        </p:sp>
+        <p:sp>
+          <p:nvSpPr>
+            <p:cNvPr id="16" name="Freeform: Shape 11">
+              <a:extLst>
+                <a:ext uri="{FF2B5EF4-FFF2-40B4-BE49-F238E27FC236}">
+                  <a16:creationId xmlns:a16="http://schemas.microsoft.com/office/drawing/2014/main" id="{457D3732-8229-3D62-E0A9-1CCCA4F9BE57}"/>
+                </a:ext>
+                <a:ext uri="{C183D7F6-B498-43B3-948B-1728B52AA6E4}">
+                  <adec:decorative xmlns:adec="http://schemas.microsoft.com/office/drawing/2017/decorative" val="1"/>
+                </a:ext>
+              </a:extLst>
+            </p:cNvPr>
+            <p:cNvSpPr/>
+            <p:nvPr>
+              <p:extLst>
+                <p:ext uri="{386F3935-93C4-4BCD-93E2-E3B085C9AB24}">
+                  <p16:designElem xmlns:p16="http://schemas.microsoft.com/office/powerpoint/2015/main" val="1"/>
+                </p:ext>
+              </p:extLst>
+            </p:nvPr>
+          </p:nvSpPr>
+          <p:spPr>
+            <a:xfrm>
+              <a:off x="11479015" y="0"/>
+              <a:ext cx="712985" cy="6858000"/>
+            </a:xfrm>
+            <a:custGeom>
+              <a:avLst/>
+              <a:gdLst>
+                <a:gd name="connsiteX0" fmla="*/ 280560 w 712985"/>
+                <a:gd name="connsiteY0" fmla="*/ 0 h 6858000"/>
+                <a:gd name="connsiteX1" fmla="*/ 712985 w 712985"/>
+                <a:gd name="connsiteY1" fmla="*/ 0 h 6858000"/>
+                <a:gd name="connsiteX2" fmla="*/ 712985 w 712985"/>
+                <a:gd name="connsiteY2" fmla="*/ 6858000 h 6858000"/>
+                <a:gd name="connsiteX3" fmla="*/ 372527 w 712985"/>
+                <a:gd name="connsiteY3" fmla="*/ 6858000 h 6858000"/>
+                <a:gd name="connsiteX4" fmla="*/ 372901 w 712985"/>
+                <a:gd name="connsiteY4" fmla="*/ 6835810 h 6858000"/>
+                <a:gd name="connsiteX5" fmla="*/ 363017 w 712985"/>
+                <a:gd name="connsiteY5" fmla="*/ 6518145 h 6858000"/>
+                <a:gd name="connsiteX6" fmla="*/ 310498 w 712985"/>
+                <a:gd name="connsiteY6" fmla="*/ 6393936 h 6858000"/>
+                <a:gd name="connsiteX7" fmla="*/ 305420 w 712985"/>
+                <a:gd name="connsiteY7" fmla="*/ 6355564 h 6858000"/>
+                <a:gd name="connsiteX8" fmla="*/ 311030 w 712985"/>
+                <a:gd name="connsiteY8" fmla="*/ 6267729 h 6858000"/>
+                <a:gd name="connsiteX9" fmla="*/ 281440 w 712985"/>
+                <a:gd name="connsiteY9" fmla="*/ 6090959 h 6858000"/>
+                <a:gd name="connsiteX10" fmla="*/ 258928 w 712985"/>
+                <a:gd name="connsiteY10" fmla="*/ 6026981 h 6858000"/>
+                <a:gd name="connsiteX11" fmla="*/ 245105 w 712985"/>
+                <a:gd name="connsiteY11" fmla="*/ 5991615 h 6858000"/>
+                <a:gd name="connsiteX12" fmla="*/ 197441 w 712985"/>
+                <a:gd name="connsiteY12" fmla="*/ 5807458 h 6858000"/>
+                <a:gd name="connsiteX13" fmla="*/ 159115 w 712985"/>
+                <a:gd name="connsiteY13" fmla="*/ 5727356 h 6858000"/>
+                <a:gd name="connsiteX14" fmla="*/ 152306 w 712985"/>
+                <a:gd name="connsiteY14" fmla="*/ 5705270 h 6858000"/>
+                <a:gd name="connsiteX15" fmla="*/ 150939 w 712985"/>
+                <a:gd name="connsiteY15" fmla="*/ 5580441 h 6858000"/>
+                <a:gd name="connsiteX16" fmla="*/ 187956 w 712985"/>
+                <a:gd name="connsiteY16" fmla="*/ 5482729 h 6858000"/>
+                <a:gd name="connsiteX17" fmla="*/ 201902 w 712985"/>
+                <a:gd name="connsiteY17" fmla="*/ 5463053 h 6858000"/>
+                <a:gd name="connsiteX18" fmla="*/ 168174 w 712985"/>
+                <a:gd name="connsiteY18" fmla="*/ 5205662 h 6858000"/>
+                <a:gd name="connsiteX19" fmla="*/ 157186 w 712985"/>
+                <a:gd name="connsiteY19" fmla="*/ 5166766 h 6858000"/>
+                <a:gd name="connsiteX20" fmla="*/ 163999 w 712985"/>
+                <a:gd name="connsiteY20" fmla="*/ 4972256 h 6858000"/>
+                <a:gd name="connsiteX21" fmla="*/ 163388 w 712985"/>
+                <a:gd name="connsiteY21" fmla="*/ 4915833 h 6858000"/>
+                <a:gd name="connsiteX22" fmla="*/ 166361 w 712985"/>
+                <a:gd name="connsiteY22" fmla="*/ 4712964 h 6858000"/>
+                <a:gd name="connsiteX23" fmla="*/ 140122 w 712985"/>
+                <a:gd name="connsiteY23" fmla="*/ 4687152 h 6858000"/>
+                <a:gd name="connsiteX24" fmla="*/ 73058 w 712985"/>
+                <a:gd name="connsiteY24" fmla="*/ 4611951 h 6858000"/>
+                <a:gd name="connsiteX25" fmla="*/ 3979 w 712985"/>
+                <a:gd name="connsiteY25" fmla="*/ 4456771 h 6858000"/>
+                <a:gd name="connsiteX26" fmla="*/ 2091 w 712985"/>
+                <a:gd name="connsiteY26" fmla="*/ 4412781 h 6858000"/>
+                <a:gd name="connsiteX27" fmla="*/ 75905 w 712985"/>
+                <a:gd name="connsiteY27" fmla="*/ 4292897 h 6858000"/>
+                <a:gd name="connsiteX28" fmla="*/ 104434 w 712985"/>
+                <a:gd name="connsiteY28" fmla="*/ 4235333 h 6858000"/>
+                <a:gd name="connsiteX29" fmla="*/ 151065 w 712985"/>
+                <a:gd name="connsiteY29" fmla="*/ 4075686 h 6858000"/>
+                <a:gd name="connsiteX30" fmla="*/ 161243 w 712985"/>
+                <a:gd name="connsiteY30" fmla="*/ 4061695 h 6858000"/>
+                <a:gd name="connsiteX31" fmla="*/ 286285 w 712985"/>
+                <a:gd name="connsiteY31" fmla="*/ 3933862 h 6858000"/>
+                <a:gd name="connsiteX32" fmla="*/ 306926 w 712985"/>
+                <a:gd name="connsiteY32" fmla="*/ 3905847 h 6858000"/>
+                <a:gd name="connsiteX33" fmla="*/ 340015 w 712985"/>
+                <a:gd name="connsiteY33" fmla="*/ 3871199 h 6858000"/>
+                <a:gd name="connsiteX34" fmla="*/ 400111 w 712985"/>
+                <a:gd name="connsiteY34" fmla="*/ 3767743 h 6858000"/>
+                <a:gd name="connsiteX35" fmla="*/ 409694 w 712985"/>
+                <a:gd name="connsiteY35" fmla="*/ 3646690 h 6858000"/>
+                <a:gd name="connsiteX36" fmla="*/ 428447 w 712985"/>
+                <a:gd name="connsiteY36" fmla="*/ 3499752 h 6858000"/>
+                <a:gd name="connsiteX37" fmla="*/ 445033 w 712985"/>
+                <a:gd name="connsiteY37" fmla="*/ 3437349 h 6858000"/>
+                <a:gd name="connsiteX38" fmla="*/ 471431 w 712985"/>
+                <a:gd name="connsiteY38" fmla="*/ 3272018 h 6858000"/>
+                <a:gd name="connsiteX39" fmla="*/ 495919 w 712985"/>
+                <a:gd name="connsiteY39" fmla="*/ 3153432 h 6858000"/>
+                <a:gd name="connsiteX40" fmla="*/ 499541 w 712985"/>
+                <a:gd name="connsiteY40" fmla="*/ 2985907 h 6858000"/>
+                <a:gd name="connsiteX41" fmla="*/ 491640 w 712985"/>
+                <a:gd name="connsiteY41" fmla="*/ 2905697 h 6858000"/>
+                <a:gd name="connsiteX42" fmla="*/ 586592 w 712985"/>
+                <a:gd name="connsiteY42" fmla="*/ 2746325 h 6858000"/>
+                <a:gd name="connsiteX43" fmla="*/ 647211 w 712985"/>
+                <a:gd name="connsiteY43" fmla="*/ 2620857 h 6858000"/>
+                <a:gd name="connsiteX44" fmla="*/ 598120 w 712985"/>
+                <a:gd name="connsiteY44" fmla="*/ 2501248 h 6858000"/>
+                <a:gd name="connsiteX45" fmla="*/ 560897 w 712985"/>
+                <a:gd name="connsiteY45" fmla="*/ 2471368 h 6858000"/>
+                <a:gd name="connsiteX46" fmla="*/ 506928 w 712985"/>
+                <a:gd name="connsiteY46" fmla="*/ 2272389 h 6858000"/>
+                <a:gd name="connsiteX47" fmla="*/ 474122 w 712985"/>
+                <a:gd name="connsiteY47" fmla="*/ 1983284 h 6858000"/>
+                <a:gd name="connsiteX48" fmla="*/ 349180 w 712985"/>
+                <a:gd name="connsiteY48" fmla="*/ 1510207 h 6858000"/>
+                <a:gd name="connsiteX49" fmla="*/ 306451 w 712985"/>
+                <a:gd name="connsiteY49" fmla="*/ 1430003 h 6858000"/>
+                <a:gd name="connsiteX50" fmla="*/ 287747 w 712985"/>
+                <a:gd name="connsiteY50" fmla="*/ 1336633 h 6858000"/>
+                <a:gd name="connsiteX51" fmla="*/ 304326 w 712985"/>
+                <a:gd name="connsiteY51" fmla="*/ 1298229 h 6858000"/>
+                <a:gd name="connsiteX52" fmla="*/ 317671 w 712985"/>
+                <a:gd name="connsiteY52" fmla="*/ 1136667 h 6858000"/>
+                <a:gd name="connsiteX53" fmla="*/ 314959 w 712985"/>
+                <a:gd name="connsiteY53" fmla="*/ 1106522 h 6858000"/>
+                <a:gd name="connsiteX54" fmla="*/ 290675 w 712985"/>
+                <a:gd name="connsiteY54" fmla="*/ 1004980 h 6858000"/>
+                <a:gd name="connsiteX55" fmla="*/ 272712 w 712985"/>
+                <a:gd name="connsiteY55" fmla="*/ 910357 h 6858000"/>
+                <a:gd name="connsiteX56" fmla="*/ 270963 w 712985"/>
+                <a:gd name="connsiteY56" fmla="*/ 667028 h 6858000"/>
+                <a:gd name="connsiteX57" fmla="*/ 244986 w 712985"/>
+                <a:gd name="connsiteY57" fmla="*/ 483131 h 6858000"/>
+                <a:gd name="connsiteX58" fmla="*/ 241465 w 712985"/>
+                <a:gd name="connsiteY58" fmla="*/ 397465 h 6858000"/>
+                <a:gd name="connsiteX59" fmla="*/ 244890 w 712985"/>
+                <a:gd name="connsiteY59" fmla="*/ 348507 h 6858000"/>
+                <a:gd name="connsiteX60" fmla="*/ 293439 w 712985"/>
+                <a:gd name="connsiteY60" fmla="*/ 233141 h 6858000"/>
+                <a:gd name="connsiteX61" fmla="*/ 300513 w 712985"/>
+                <a:gd name="connsiteY61" fmla="*/ 172069 h 6858000"/>
+              </a:gdLst>
+              <a:ahLst/>
+              <a:cxnLst>
+                <a:cxn ang="0">
+                  <a:pos x="connsiteX0" y="connsiteY0"/>
+                </a:cxn>
+                <a:cxn ang="0">
+                  <a:pos x="connsiteX1" y="connsiteY1"/>
+                </a:cxn>
+                <a:cxn ang="0">
+                  <a:pos x="connsiteX2" y="connsiteY2"/>
+                </a:cxn>
+                <a:cxn ang="0">
+                  <a:pos x="connsiteX3" y="connsiteY3"/>
+                </a:cxn>
+                <a:cxn ang="0">
+                  <a:pos x="connsiteX4" y="connsiteY4"/>
+                </a:cxn>
+                <a:cxn ang="0">
+                  <a:pos x="connsiteX5" y="connsiteY5"/>
+                </a:cxn>
+                <a:cxn ang="0">
+                  <a:pos x="connsiteX6" y="connsiteY6"/>
+                </a:cxn>
+                <a:cxn ang="0">
+                  <a:pos x="connsiteX7" y="connsiteY7"/>
+                </a:cxn>
+                <a:cxn ang="0">
+                  <a:pos x="connsiteX8" y="connsiteY8"/>
+                </a:cxn>
+                <a:cxn ang="0">
+                  <a:pos x="connsiteX9" y="connsiteY9"/>
+                </a:cxn>
+                <a:cxn ang="0">
+                  <a:pos x="connsiteX10" y="connsiteY10"/>
+                </a:cxn>
+                <a:cxn ang="0">
+                  <a:pos x="connsiteX11" y="connsiteY11"/>
+                </a:cxn>
+                <a:cxn ang="0">
+                  <a:pos x="connsiteX12" y="connsiteY12"/>
+                </a:cxn>
+                <a:cxn ang="0">
+                  <a:pos x="connsiteX13" y="connsiteY13"/>
+                </a:cxn>
+                <a:cxn ang="0">
+                  <a:pos x="connsiteX14" y="connsiteY14"/>
+                </a:cxn>
+                <a:cxn ang="0">
+                  <a:pos x="connsiteX15" y="connsiteY15"/>
+                </a:cxn>
+                <a:cxn ang="0">
+                  <a:pos x="connsiteX16" y="connsiteY16"/>
+                </a:cxn>
+                <a:cxn ang="0">
+                  <a:pos x="connsiteX17" y="connsiteY17"/>
+                </a:cxn>
+                <a:cxn ang="0">
+                  <a:pos x="connsiteX18" y="connsiteY18"/>
+                </a:cxn>
+                <a:cxn ang="0">
+                  <a:pos x="connsiteX19" y="connsiteY19"/>
+                </a:cxn>
+                <a:cxn ang="0">
+                  <a:pos x="connsiteX20" y="connsiteY20"/>
+                </a:cxn>
+                <a:cxn ang="0">
+                  <a:pos x="connsiteX21" y="connsiteY21"/>
+                </a:cxn>
+                <a:cxn ang="0">
+                  <a:pos x="connsiteX22" y="connsiteY22"/>
+                </a:cxn>
+                <a:cxn ang="0">
+                  <a:pos x="connsiteX23" y="connsiteY23"/>
+                </a:cxn>
+                <a:cxn ang="0">
+                  <a:pos x="connsiteX24" y="connsiteY24"/>
+                </a:cxn>
+                <a:cxn ang="0">
+                  <a:pos x="connsiteX25" y="connsiteY25"/>
+                </a:cxn>
+                <a:cxn ang="0">
+                  <a:pos x="connsiteX26" y="connsiteY26"/>
+                </a:cxn>
+                <a:cxn ang="0">
+                  <a:pos x="connsiteX27" y="connsiteY27"/>
+                </a:cxn>
+                <a:cxn ang="0">
+                  <a:pos x="connsiteX28" y="connsiteY28"/>
+                </a:cxn>
+                <a:cxn ang="0">
+                  <a:pos x="connsiteX29" y="connsiteY29"/>
+                </a:cxn>
+                <a:cxn ang="0">
+                  <a:pos x="connsiteX30" y="connsiteY30"/>
+                </a:cxn>
+                <a:cxn ang="0">
+                  <a:pos x="connsiteX31" y="connsiteY31"/>
+                </a:cxn>
+                <a:cxn ang="0">
+                  <a:pos x="connsiteX32" y="connsiteY32"/>
+                </a:cxn>
+                <a:cxn ang="0">
+                  <a:pos x="connsiteX33" y="connsiteY33"/>
+                </a:cxn>
+                <a:cxn ang="0">
+                  <a:pos x="connsiteX34" y="connsiteY34"/>
+                </a:cxn>
+                <a:cxn ang="0">
+                  <a:pos x="connsiteX35" y="connsiteY35"/>
+                </a:cxn>
+                <a:cxn ang="0">
+                  <a:pos x="connsiteX36" y="connsiteY36"/>
+                </a:cxn>
+                <a:cxn ang="0">
+                  <a:pos x="connsiteX37" y="connsiteY37"/>
+                </a:cxn>
+                <a:cxn ang="0">
+                  <a:pos x="connsiteX38" y="connsiteY38"/>
+                </a:cxn>
+                <a:cxn ang="0">
+                  <a:pos x="connsiteX39" y="connsiteY39"/>
+                </a:cxn>
+                <a:cxn ang="0">
+                  <a:pos x="connsiteX40" y="connsiteY40"/>
+                </a:cxn>
+                <a:cxn ang="0">
+                  <a:pos x="connsiteX41" y="connsiteY41"/>
+                </a:cxn>
+                <a:cxn ang="0">
+                  <a:pos x="connsiteX42" y="connsiteY42"/>
+                </a:cxn>
+                <a:cxn ang="0">
+                  <a:pos x="connsiteX43" y="connsiteY43"/>
+                </a:cxn>
+                <a:cxn ang="0">
+                  <a:pos x="connsiteX44" y="connsiteY44"/>
+                </a:cxn>
+                <a:cxn ang="0">
+                  <a:pos x="connsiteX45" y="connsiteY45"/>
+                </a:cxn>
+                <a:cxn ang="0">
+                  <a:pos x="connsiteX46" y="connsiteY46"/>
+                </a:cxn>
+                <a:cxn ang="0">
+                  <a:pos x="connsiteX47" y="connsiteY47"/>
+                </a:cxn>
+                <a:cxn ang="0">
+                  <a:pos x="connsiteX48" y="connsiteY48"/>
+                </a:cxn>
+                <a:cxn ang="0">
+                  <a:pos x="connsiteX49" y="connsiteY49"/>
+                </a:cxn>
+                <a:cxn ang="0">
+                  <a:pos x="connsiteX50" y="connsiteY50"/>
+                </a:cxn>
+                <a:cxn ang="0">
+                  <a:pos x="connsiteX51" y="connsiteY51"/>
+                </a:cxn>
+                <a:cxn ang="0">
+                  <a:pos x="connsiteX52" y="connsiteY52"/>
+                </a:cxn>
+                <a:cxn ang="0">
+                  <a:pos x="connsiteX53" y="connsiteY53"/>
+                </a:cxn>
+                <a:cxn ang="0">
+                  <a:pos x="connsiteX54" y="connsiteY54"/>
+                </a:cxn>
+                <a:cxn ang="0">
+                  <a:pos x="connsiteX55" y="connsiteY55"/>
+                </a:cxn>
+                <a:cxn ang="0">
+                  <a:pos x="connsiteX56" y="connsiteY56"/>
+                </a:cxn>
+                <a:cxn ang="0">
+                  <a:pos x="connsiteX57" y="connsiteY57"/>
+                </a:cxn>
+                <a:cxn ang="0">
+                  <a:pos x="connsiteX58" y="connsiteY58"/>
+                </a:cxn>
+                <a:cxn ang="0">
+                  <a:pos x="connsiteX59" y="connsiteY59"/>
+                </a:cxn>
+                <a:cxn ang="0">
+                  <a:pos x="connsiteX60" y="connsiteY60"/>
+                </a:cxn>
+                <a:cxn ang="0">
+                  <a:pos x="connsiteX61" y="connsiteY61"/>
+                </a:cxn>
+              </a:cxnLst>
+              <a:rect l="l" t="t" r="r" b="b"/>
+              <a:pathLst>
+                <a:path w="712985" h="6858000">
+                  <a:moveTo>
+                    <a:pt x="280560" y="0"/>
+                  </a:moveTo>
+                  <a:lnTo>
+                    <a:pt x="712985" y="0"/>
+                  </a:lnTo>
+                  <a:lnTo>
+                    <a:pt x="712985" y="6858000"/>
+                  </a:lnTo>
+                  <a:lnTo>
+                    <a:pt x="372527" y="6858000"/>
+                  </a:lnTo>
+                  <a:lnTo>
+                    <a:pt x="372901" y="6835810"/>
+                  </a:lnTo>
+                  <a:cubicBezTo>
+                    <a:pt x="343741" y="6729822"/>
+                    <a:pt x="373381" y="6623551"/>
+                    <a:pt x="363017" y="6518145"/>
+                  </a:cubicBezTo>
+                  <a:cubicBezTo>
+                    <a:pt x="358372" y="6470360"/>
+                    <a:pt x="362468" y="6422202"/>
+                    <a:pt x="310498" y="6393936"/>
+                  </a:cubicBezTo>
+                  <a:cubicBezTo>
+                    <a:pt x="303659" y="6390296"/>
+                    <a:pt x="304819" y="6368800"/>
+                    <a:pt x="305420" y="6355564"/>
+                  </a:cubicBezTo>
+                  <a:cubicBezTo>
+                    <a:pt x="306594" y="6326166"/>
+                    <a:pt x="314451" y="6296329"/>
+                    <a:pt x="311030" y="6267729"/>
+                  </a:cubicBezTo>
+                  <a:cubicBezTo>
+                    <a:pt x="304253" y="6208466"/>
+                    <a:pt x="293104" y="6149393"/>
+                    <a:pt x="281440" y="6090959"/>
+                  </a:cubicBezTo>
+                  <a:cubicBezTo>
+                    <a:pt x="276978" y="6068911"/>
+                    <a:pt x="266829" y="6048361"/>
+                    <a:pt x="258928" y="6026981"/>
+                  </a:cubicBezTo>
+                  <a:cubicBezTo>
+                    <a:pt x="254416" y="6015184"/>
+                    <a:pt x="244605" y="6003083"/>
+                    <a:pt x="245105" y="5991615"/>
+                  </a:cubicBezTo>
+                  <a:cubicBezTo>
+                    <a:pt x="248075" y="5925141"/>
+                    <a:pt x="216651" y="5867990"/>
+                    <a:pt x="197441" y="5807458"/>
+                  </a:cubicBezTo>
+                  <a:cubicBezTo>
+                    <a:pt x="188523" y="5779456"/>
+                    <a:pt x="171697" y="5754078"/>
+                    <a:pt x="159115" y="5727356"/>
+                  </a:cubicBezTo>
+                  <a:cubicBezTo>
+                    <a:pt x="155717" y="5720411"/>
+                    <a:pt x="152517" y="5712566"/>
+                    <a:pt x="152306" y="5705270"/>
+                  </a:cubicBezTo>
+                  <a:cubicBezTo>
+                    <a:pt x="151252" y="5663532"/>
+                    <a:pt x="151674" y="5621922"/>
+                    <a:pt x="150939" y="5580441"/>
+                  </a:cubicBezTo>
+                  <a:cubicBezTo>
+                    <a:pt x="150326" y="5542748"/>
+                    <a:pt x="147369" y="5505023"/>
+                    <a:pt x="187956" y="5482729"/>
+                  </a:cubicBezTo>
+                  <a:cubicBezTo>
+                    <a:pt x="194324" y="5479395"/>
+                    <a:pt x="198291" y="5470181"/>
+                    <a:pt x="201902" y="5463053"/>
+                  </a:cubicBezTo>
+                  <a:cubicBezTo>
+                    <a:pt x="257480" y="5353065"/>
+                    <a:pt x="249730" y="5298303"/>
+                    <a:pt x="168174" y="5205662"/>
+                  </a:cubicBezTo>
+                  <a:cubicBezTo>
+                    <a:pt x="159805" y="5196040"/>
+                    <a:pt x="152161" y="5174340"/>
+                    <a:pt x="157186" y="5166766"/>
+                  </a:cubicBezTo>
+                  <a:cubicBezTo>
+                    <a:pt x="198743" y="5102508"/>
+                    <a:pt x="186477" y="5038579"/>
+                    <a:pt x="163999" y="4972256"/>
+                  </a:cubicBezTo>
+                  <a:cubicBezTo>
+                    <a:pt x="158020" y="4955056"/>
+                    <a:pt x="155299" y="4930181"/>
+                    <a:pt x="163388" y="4915833"/>
+                  </a:cubicBezTo>
+                  <a:cubicBezTo>
+                    <a:pt x="200708" y="4847649"/>
+                    <a:pt x="186907" y="4780374"/>
+                    <a:pt x="166361" y="4712964"/>
+                  </a:cubicBezTo>
+                  <a:cubicBezTo>
+                    <a:pt x="163165" y="4702485"/>
+                    <a:pt x="150748" y="4690669"/>
+                    <a:pt x="140122" y="4687152"/>
+                  </a:cubicBezTo>
+                  <a:cubicBezTo>
+                    <a:pt x="102452" y="4674589"/>
+                    <a:pt x="86917" y="4644970"/>
+                    <a:pt x="73058" y="4611951"/>
+                  </a:cubicBezTo>
+                  <a:cubicBezTo>
+                    <a:pt x="50686" y="4559957"/>
+                    <a:pt x="25516" y="4509149"/>
+                    <a:pt x="3979" y="4456771"/>
+                  </a:cubicBezTo>
+                  <a:cubicBezTo>
+                    <a:pt x="-1236" y="4443877"/>
+                    <a:pt x="-726" y="4427139"/>
+                    <a:pt x="2091" y="4412781"/>
+                  </a:cubicBezTo>
+                  <a:cubicBezTo>
+                    <a:pt x="11653" y="4363733"/>
+                    <a:pt x="45382" y="4329603"/>
+                    <a:pt x="75905" y="4292897"/>
+                  </a:cubicBezTo>
+                  <a:cubicBezTo>
+                    <a:pt x="89361" y="4276787"/>
+                    <a:pt x="97880" y="4255660"/>
+                    <a:pt x="104434" y="4235333"/>
+                  </a:cubicBezTo>
+                  <a:cubicBezTo>
+                    <a:pt x="121200" y="4182569"/>
+                    <a:pt x="135523" y="4128901"/>
+                    <a:pt x="151065" y="4075686"/>
+                  </a:cubicBezTo>
+                  <a:cubicBezTo>
+                    <a:pt x="152552" y="4070549"/>
+                    <a:pt x="157315" y="4065932"/>
+                    <a:pt x="161243" y="4061695"/>
+                  </a:cubicBezTo>
+                  <a:cubicBezTo>
+                    <a:pt x="202828" y="4019095"/>
+                    <a:pt x="244731" y="3976753"/>
+                    <a:pt x="286285" y="3933862"/>
+                  </a:cubicBezTo>
+                  <a:cubicBezTo>
+                    <a:pt x="294168" y="3925683"/>
+                    <a:pt x="299393" y="3914571"/>
+                    <a:pt x="306926" y="3905847"/>
+                  </a:cubicBezTo>
+                  <a:cubicBezTo>
+                    <a:pt x="317292" y="3893589"/>
+                    <a:pt x="326766" y="3878502"/>
+                    <a:pt x="340015" y="3871199"/>
+                  </a:cubicBezTo>
+                  <a:cubicBezTo>
+                    <a:pt x="381725" y="3848490"/>
+                    <a:pt x="396760" y="3812013"/>
+                    <a:pt x="400111" y="3767743"/>
+                  </a:cubicBezTo>
+                  <a:cubicBezTo>
+                    <a:pt x="403294" y="3727294"/>
+                    <a:pt x="405323" y="3686973"/>
+                    <a:pt x="409694" y="3646690"/>
+                  </a:cubicBezTo>
+                  <a:cubicBezTo>
+                    <a:pt x="414852" y="3597538"/>
+                    <a:pt x="420910" y="3548579"/>
+                    <a:pt x="428447" y="3499752"/>
+                  </a:cubicBezTo>
+                  <a:cubicBezTo>
+                    <a:pt x="431696" y="3478619"/>
+                    <a:pt x="435683" y="3456228"/>
+                    <a:pt x="445033" y="3437349"/>
+                  </a:cubicBezTo>
+                  <a:cubicBezTo>
+                    <a:pt x="470858" y="3384475"/>
+                    <a:pt x="486179" y="3329236"/>
+                    <a:pt x="471431" y="3272018"/>
+                  </a:cubicBezTo>
+                  <a:cubicBezTo>
+                    <a:pt x="459682" y="3226180"/>
+                    <a:pt x="472474" y="3185267"/>
+                    <a:pt x="495919" y="3153432"/>
+                  </a:cubicBezTo>
+                  <a:cubicBezTo>
+                    <a:pt x="538461" y="3095505"/>
+                    <a:pt x="521296" y="3040311"/>
+                    <a:pt x="499541" y="2985907"/>
+                  </a:cubicBezTo>
+                  <a:cubicBezTo>
+                    <a:pt x="488276" y="2957871"/>
+                    <a:pt x="486838" y="2934028"/>
+                    <a:pt x="491640" y="2905697"/>
+                  </a:cubicBezTo>
+                  <a:cubicBezTo>
+                    <a:pt x="502898" y="2840071"/>
+                    <a:pt x="547705" y="2792141"/>
+                    <a:pt x="586592" y="2746325"/>
+                  </a:cubicBezTo>
+                  <a:cubicBezTo>
+                    <a:pt x="619786" y="2707275"/>
+                    <a:pt x="636305" y="2665661"/>
+                    <a:pt x="647211" y="2620857"/>
+                  </a:cubicBezTo>
+                  <a:cubicBezTo>
+                    <a:pt x="661216" y="2564298"/>
+                    <a:pt x="648982" y="2522027"/>
+                    <a:pt x="598120" y="2501248"/>
+                  </a:cubicBezTo>
+                  <a:cubicBezTo>
+                    <a:pt x="583733" y="2495506"/>
+                    <a:pt x="566431" y="2484521"/>
+                    <a:pt x="560897" y="2471368"/>
+                  </a:cubicBezTo>
+                  <a:cubicBezTo>
+                    <a:pt x="533469" y="2407931"/>
+                    <a:pt x="496686" y="2344634"/>
+                    <a:pt x="506928" y="2272389"/>
+                  </a:cubicBezTo>
+                  <a:cubicBezTo>
+                    <a:pt x="520879" y="2172517"/>
+                    <a:pt x="509052" y="2077807"/>
+                    <a:pt x="474122" y="1983284"/>
+                  </a:cubicBezTo>
+                  <a:cubicBezTo>
+                    <a:pt x="417537" y="1829959"/>
+                    <a:pt x="358639" y="1676886"/>
+                    <a:pt x="349180" y="1510207"/>
+                  </a:cubicBezTo>
+                  <a:cubicBezTo>
+                    <a:pt x="347619" y="1482573"/>
+                    <a:pt x="326399" y="1451821"/>
+                    <a:pt x="306451" y="1430003"/>
+                  </a:cubicBezTo>
+                  <a:cubicBezTo>
+                    <a:pt x="268511" y="1388202"/>
+                    <a:pt x="266127" y="1390512"/>
+                    <a:pt x="287747" y="1336633"/>
+                  </a:cubicBezTo>
+                  <a:cubicBezTo>
+                    <a:pt x="293070" y="1323756"/>
+                    <a:pt x="295470" y="1308272"/>
+                    <a:pt x="304326" y="1298229"/>
+                  </a:cubicBezTo>
+                  <a:cubicBezTo>
+                    <a:pt x="349361" y="1247057"/>
+                    <a:pt x="331041" y="1191986"/>
+                    <a:pt x="317671" y="1136667"/>
+                  </a:cubicBezTo>
+                  <a:cubicBezTo>
+                    <a:pt x="315148" y="1126990"/>
+                    <a:pt x="311827" y="1115354"/>
+                    <a:pt x="314959" y="1106522"/>
+                  </a:cubicBezTo>
+                  <a:cubicBezTo>
+                    <a:pt x="329032" y="1066641"/>
+                    <a:pt x="319157" y="1035231"/>
+                    <a:pt x="290675" y="1004980"/>
+                  </a:cubicBezTo>
+                  <a:cubicBezTo>
+                    <a:pt x="266138" y="978690"/>
+                    <a:pt x="249805" y="947108"/>
+                    <a:pt x="272712" y="910357"/>
+                  </a:cubicBezTo>
+                  <a:cubicBezTo>
+                    <a:pt x="323486" y="828702"/>
+                    <a:pt x="317578" y="747981"/>
+                    <a:pt x="270963" y="667028"/>
+                  </a:cubicBezTo>
+                  <a:cubicBezTo>
+                    <a:pt x="237707" y="609204"/>
+                    <a:pt x="225082" y="549995"/>
+                    <a:pt x="244986" y="483131"/>
+                  </a:cubicBezTo>
+                  <a:cubicBezTo>
+                    <a:pt x="252708" y="457408"/>
+                    <a:pt x="242285" y="426353"/>
+                    <a:pt x="241465" y="397465"/>
+                  </a:cubicBezTo>
+                  <a:cubicBezTo>
+                    <a:pt x="240850" y="381142"/>
+                    <a:pt x="239176" y="363176"/>
+                    <a:pt x="244890" y="348507"/>
+                  </a:cubicBezTo>
+                  <a:cubicBezTo>
+                    <a:pt x="259350" y="309454"/>
+                    <a:pt x="279299" y="272445"/>
+                    <a:pt x="293439" y="233141"/>
+                  </a:cubicBezTo>
+                  <a:cubicBezTo>
+                    <a:pt x="300152" y="214256"/>
+                    <a:pt x="302437" y="192349"/>
+                    <a:pt x="300513" y="172069"/>
+                  </a:cubicBezTo>
+                  <a:close/>
+                </a:path>
+              </a:pathLst>
+            </a:custGeom>
+            <a:blipFill>
+              <a:blip r:embed="rId3">
+                <a:alphaModFix amt="57000"/>
+              </a:blip>
+              <a:tile tx="0" ty="0" sx="100000" sy="100000" flip="none" algn="tl"/>
+            </a:blipFill>
+            <a:ln w="12700" cap="flat" cmpd="sng" algn="ctr">
+              <a:noFill/>
+              <a:prstDash val="solid"/>
+              <a:miter lim="800000"/>
+            </a:ln>
+            <a:effectLst/>
+          </p:spPr>
+          <p:style>
+            <a:lnRef idx="2">
+              <a:schemeClr val="accent1">
+                <a:shade val="50000"/>
+              </a:schemeClr>
+            </a:lnRef>
+            <a:fillRef idx="1">
+              <a:schemeClr val="accent1"/>
+            </a:fillRef>
+            <a:effectRef idx="0">
+              <a:schemeClr val="accent1"/>
+            </a:effectRef>
+            <a:fontRef idx="minor">
+              <a:schemeClr val="lt1"/>
+            </a:fontRef>
+          </p:style>
+          <p:txBody>
+            <a:bodyPr wrap="square" rtlCol="0" anchor="ctr">
+              <a:noAutofit/>
+            </a:bodyPr>
+            <a:lstStyle/>
+            <a:p>
+              <a:pPr marL="0" marR="0" lvl="0" indent="0" algn="ctr" defTabSz="914400" rtl="0" eaLnBrk="1" fontAlgn="auto" latinLnBrk="0" hangingPunct="1">
+                <a:lnSpc>
+                  <a:spcPct val="100000"/>
+                </a:lnSpc>
+                <a:spcBef>
+                  <a:spcPts val="0"/>
+                </a:spcBef>
+                <a:spcAft>
+                  <a:spcPts val="0"/>
+                </a:spcAft>
+                <a:buClrTx/>
+                <a:buSzTx/>
+                <a:buFontTx/>
+                <a:buNone/>
+                <a:tabLst/>
+                <a:defRPr/>
+              </a:pPr>
+              <a:endParaRPr kumimoji="0" lang="en-US" sz="1800" b="0" i="0" u="none" strike="noStrike" kern="1200" cap="none" spc="0" normalizeH="0" baseline="0" noProof="0">
+                <a:ln>
+                  <a:noFill/>
+                </a:ln>
+                <a:solidFill>
+                  <a:prstClr val="white"/>
+                </a:solidFill>
+                <a:effectLst/>
+                <a:uLnTx/>
+                <a:uFillTx/>
+                <a:latin typeface="Aptos" panose="02110004020202020204"/>
+                <a:ea typeface="+mn-ea"/>
+                <a:cs typeface="+mn-cs"/>
+              </a:endParaRPr>
+            </a:p>
+          </p:txBody>
+        </p:sp>
+      </p:grpSp>
+      <p:pic>
+        <p:nvPicPr>
+          <p:cNvPr id="5" name="Picture 4">
+            <a:extLst>
+              <a:ext uri="{FF2B5EF4-FFF2-40B4-BE49-F238E27FC236}">
+                <a16:creationId xmlns:a16="http://schemas.microsoft.com/office/drawing/2014/main" id="{B5BE81DA-4377-5BAC-2954-05BB06F04AB1}"/>
+              </a:ext>
+            </a:extLst>
+          </p:cNvPr>
+          <p:cNvPicPr>
+            <a:picLocks noChangeAspect="1"/>
+          </p:cNvPicPr>
+          <p:nvPr/>
+        </p:nvPicPr>
+        <p:blipFill>
+          <a:blip r:embed="rId4"/>
+          <a:stretch>
+            <a:fillRect/>
+          </a:stretch>
+        </p:blipFill>
+        <p:spPr>
+          <a:xfrm>
+            <a:off x="5222081" y="2870200"/>
+            <a:ext cx="5295900" cy="558800"/>
+          </a:xfrm>
+          <a:prstGeom prst="rect">
+            <a:avLst/>
+          </a:prstGeom>
+        </p:spPr>
+      </p:pic>
+      <p:pic>
+        <p:nvPicPr>
+          <p:cNvPr id="10" name="Picture 9" descr="A screenshot of a computer program&#10;&#10;AI-generated content may be incorrect.">
+            <a:extLst>
+              <a:ext uri="{FF2B5EF4-FFF2-40B4-BE49-F238E27FC236}">
+                <a16:creationId xmlns:a16="http://schemas.microsoft.com/office/drawing/2014/main" id="{E21E6F54-630D-3707-1732-9C4D22681784}"/>
+              </a:ext>
+            </a:extLst>
+          </p:cNvPr>
+          <p:cNvPicPr>
+            <a:picLocks noChangeAspect="1"/>
+          </p:cNvPicPr>
+          <p:nvPr/>
+        </p:nvPicPr>
+        <p:blipFill>
+          <a:blip r:embed="rId5"/>
+          <a:stretch>
+            <a:fillRect/>
+          </a:stretch>
+        </p:blipFill>
+        <p:spPr>
+          <a:xfrm>
+            <a:off x="5222081" y="3621752"/>
+            <a:ext cx="3022600" cy="1384300"/>
+          </a:xfrm>
+          <a:prstGeom prst="rect">
+            <a:avLst/>
+          </a:prstGeom>
+        </p:spPr>
+      </p:pic>
+    </p:spTree>
+    <p:extLst>
+      <p:ext uri="{BB962C8B-B14F-4D97-AF65-F5344CB8AC3E}">
+        <p14:creationId xmlns:p14="http://schemas.microsoft.com/office/powerpoint/2010/main" val="890377132"/>
+      </p:ext>
+    </p:extLst>
+  </p:cSld>
+  <p:clrMapOvr>
+    <a:overrideClrMapping bg1="dk1" tx1="lt1" bg2="dk2" tx2="lt2" accent1="accent1" accent2="accent2" accent3="accent3" accent4="accent4" accent5="accent5" accent6="accent6" hlink="hlink" folHlink="folHlink"/>
+  </p:clrMapOvr>
+</p:sld>
+</file>
+
+<file path=ppt/slides/slide8.xml><?xml version="1.0" encoding="utf-8"?>
+<p:sld xmlns:a="http://schemas.openxmlformats.org/drawingml/2006/main" xmlns:r="http://schemas.openxmlformats.org/officeDocument/2006/relationships" xmlns:p="http://schemas.openxmlformats.org/presentationml/2006/main">
+  <p:cSld>
+    <p:bg>
+      <p:bgPr>
+        <a:solidFill>
+          <a:schemeClr val="bg1"/>
+        </a:solidFill>
+        <a:effectLst/>
+      </p:bgPr>
+    </p:bg>
+    <p:spTree>
+      <p:nvGrpSpPr>
+        <p:cNvPr id="1" name="">
+          <a:extLst>
+            <a:ext uri="{FF2B5EF4-FFF2-40B4-BE49-F238E27FC236}">
               <a16:creationId xmlns:a16="http://schemas.microsoft.com/office/drawing/2014/main" id="{936828C5-BAA5-DAAA-DC88-7BDC22B0B28D}"/>
             </a:ext>
           </a:extLst>
@@ -25476,1772 +27242,6 @@
     <p:extLst>
       <p:ext uri="{BB962C8B-B14F-4D97-AF65-F5344CB8AC3E}">
         <p14:creationId xmlns:p14="http://schemas.microsoft.com/office/powerpoint/2010/main" val="2244512543"/>
-      </p:ext>
-    </p:extLst>
-  </p:cSld>
-  <p:clrMapOvr>
-    <a:overrideClrMapping bg1="dk1" tx1="lt1" bg2="dk2" tx2="lt2" accent1="accent1" accent2="accent2" accent3="accent3" accent4="accent4" accent5="accent5" accent6="accent6" hlink="hlink" folHlink="folHlink"/>
-  </p:clrMapOvr>
-</p:sld>
-</file>
-
-<file path=ppt/slides/slide8.xml><?xml version="1.0" encoding="utf-8"?>
-<p:sld xmlns:a="http://schemas.openxmlformats.org/drawingml/2006/main" xmlns:r="http://schemas.openxmlformats.org/officeDocument/2006/relationships" xmlns:p="http://schemas.openxmlformats.org/presentationml/2006/main">
-  <p:cSld>
-    <p:bg>
-      <p:bgPr>
-        <a:solidFill>
-          <a:schemeClr val="bg1"/>
-        </a:solidFill>
-        <a:effectLst/>
-      </p:bgPr>
-    </p:bg>
-    <p:spTree>
-      <p:nvGrpSpPr>
-        <p:cNvPr id="1" name="">
-          <a:extLst>
-            <a:ext uri="{FF2B5EF4-FFF2-40B4-BE49-F238E27FC236}">
-              <a16:creationId xmlns:a16="http://schemas.microsoft.com/office/drawing/2014/main" id="{DE4AA7D3-2DC7-6DF1-4CD8-16FD6B79615F}"/>
-            </a:ext>
-          </a:extLst>
-        </p:cNvPr>
-        <p:cNvGrpSpPr/>
-        <p:nvPr/>
-      </p:nvGrpSpPr>
-      <p:grpSpPr>
-        <a:xfrm>
-          <a:off x="0" y="0"/>
-          <a:ext cx="0" cy="0"/>
-          <a:chOff x="0" y="0"/>
-          <a:chExt cx="0" cy="0"/>
-        </a:xfrm>
-      </p:grpSpPr>
-      <p:sp useBgFill="1">
-        <p:nvSpPr>
-          <p:cNvPr id="14" name="Rectangle 13">
-            <a:extLst>
-              <a:ext uri="{FF2B5EF4-FFF2-40B4-BE49-F238E27FC236}">
-                <a16:creationId xmlns:a16="http://schemas.microsoft.com/office/drawing/2014/main" id="{BA9AAC08-9171-8075-D826-334954A9053D}"/>
-              </a:ext>
-              <a:ext uri="{C183D7F6-B498-43B3-948B-1728B52AA6E4}">
-                <adec:decorative xmlns:adec="http://schemas.microsoft.com/office/drawing/2017/decorative" val="1"/>
-              </a:ext>
-            </a:extLst>
-          </p:cNvPr>
-          <p:cNvSpPr>
-            <a:spLocks noGrp="1" noRot="1" noChangeAspect="1" noMove="1" noResize="1" noEditPoints="1" noAdjustHandles="1" noChangeArrowheads="1" noChangeShapeType="1" noTextEdit="1"/>
-          </p:cNvSpPr>
-          <p:nvPr>
-            <p:extLst>
-              <p:ext uri="{386F3935-93C4-4BCD-93E2-E3B085C9AB24}">
-                <p16:designElem xmlns:p16="http://schemas.microsoft.com/office/powerpoint/2015/main" val="1"/>
-              </p:ext>
-            </p:extLst>
-          </p:nvPr>
-        </p:nvSpPr>
-        <p:spPr>
-          <a:xfrm>
-            <a:off x="0" y="0"/>
-            <a:ext cx="12192000" cy="6858000"/>
-          </a:xfrm>
-          <a:prstGeom prst="rect">
-            <a:avLst/>
-          </a:prstGeom>
-          <a:ln w="12700" cap="flat" cmpd="sng" algn="ctr">
-            <a:noFill/>
-            <a:prstDash val="solid"/>
-            <a:miter lim="800000"/>
-          </a:ln>
-          <a:effectLst/>
-        </p:spPr>
-        <p:style>
-          <a:lnRef idx="2">
-            <a:schemeClr val="accent1">
-              <a:shade val="50000"/>
-            </a:schemeClr>
-          </a:lnRef>
-          <a:fillRef idx="1">
-            <a:schemeClr val="accent1"/>
-          </a:fillRef>
-          <a:effectRef idx="0">
-            <a:schemeClr val="accent1"/>
-          </a:effectRef>
-          <a:fontRef idx="minor">
-            <a:schemeClr val="lt1"/>
-          </a:fontRef>
-        </p:style>
-        <p:txBody>
-          <a:bodyPr rtlCol="0" anchor="ctr"/>
-          <a:lstStyle/>
-          <a:p>
-            <a:pPr marL="0" marR="0" lvl="0" indent="0" algn="ctr" defTabSz="914400" rtl="0" eaLnBrk="1" fontAlgn="auto" latinLnBrk="0" hangingPunct="1">
-              <a:lnSpc>
-                <a:spcPct val="100000"/>
-              </a:lnSpc>
-              <a:spcBef>
-                <a:spcPts val="0"/>
-              </a:spcBef>
-              <a:spcAft>
-                <a:spcPts val="0"/>
-              </a:spcAft>
-              <a:buClrTx/>
-              <a:buSzTx/>
-              <a:buFontTx/>
-              <a:buNone/>
-              <a:tabLst/>
-              <a:defRPr/>
-            </a:pPr>
-            <a:endParaRPr kumimoji="0" lang="en-US" sz="1800" b="0" i="0" u="none" strike="noStrike" kern="1200" cap="none" spc="0" normalizeH="0" baseline="0" noProof="0">
-              <a:ln>
-                <a:noFill/>
-              </a:ln>
-              <a:solidFill>
-                <a:prstClr val="white"/>
-              </a:solidFill>
-              <a:effectLst/>
-              <a:uLnTx/>
-              <a:uFillTx/>
-              <a:latin typeface="Aptos" panose="02110004020202020204"/>
-              <a:ea typeface="+mn-ea"/>
-              <a:cs typeface="+mn-cs"/>
-            </a:endParaRPr>
-          </a:p>
-        </p:txBody>
-      </p:sp>
-      <p:sp>
-        <p:nvSpPr>
-          <p:cNvPr id="2" name="Title 1">
-            <a:extLst>
-              <a:ext uri="{FF2B5EF4-FFF2-40B4-BE49-F238E27FC236}">
-                <a16:creationId xmlns:a16="http://schemas.microsoft.com/office/drawing/2014/main" id="{CD26DBDF-FD32-0862-1250-309ECEDD5094}"/>
-              </a:ext>
-            </a:extLst>
-          </p:cNvPr>
-          <p:cNvSpPr>
-            <a:spLocks noGrp="1"/>
-          </p:cNvSpPr>
-          <p:nvPr>
-            <p:ph type="title"/>
-          </p:nvPr>
-        </p:nvSpPr>
-        <p:spPr>
-          <a:xfrm>
-            <a:off x="827088" y="1641752"/>
-            <a:ext cx="3527425" cy="4366936"/>
-          </a:xfrm>
-        </p:spPr>
-        <p:txBody>
-          <a:bodyPr anchor="t">
-            <a:normAutofit/>
-          </a:bodyPr>
-          <a:lstStyle/>
-          <a:p>
-            <a:r>
-              <a:rPr lang="en-GB" sz="4000" dirty="0"/>
-              <a:t>Arrays in C#</a:t>
-            </a:r>
-            <a:endParaRPr lang="en-BE" sz="4000" dirty="0"/>
-          </a:p>
-        </p:txBody>
-      </p:sp>
-      <p:sp>
-        <p:nvSpPr>
-          <p:cNvPr id="3" name="Content Placeholder 2">
-            <a:extLst>
-              <a:ext uri="{FF2B5EF4-FFF2-40B4-BE49-F238E27FC236}">
-                <a16:creationId xmlns:a16="http://schemas.microsoft.com/office/drawing/2014/main" id="{7D28C950-A547-813A-E564-B55E788950BE}"/>
-              </a:ext>
-            </a:extLst>
-          </p:cNvPr>
-          <p:cNvSpPr>
-            <a:spLocks noGrp="1"/>
-          </p:cNvSpPr>
-          <p:nvPr>
-            <p:ph idx="1"/>
-          </p:nvPr>
-        </p:nvSpPr>
-        <p:spPr>
-          <a:xfrm>
-            <a:off x="5222081" y="1641752"/>
-            <a:ext cx="5260975" cy="3960000"/>
-          </a:xfrm>
-        </p:spPr>
-        <p:txBody>
-          <a:bodyPr>
-            <a:normAutofit/>
-          </a:bodyPr>
-          <a:lstStyle/>
-          <a:p>
-            <a:r>
-              <a:rPr lang="en-GB" sz="2400" dirty="0">
-                <a:solidFill>
-                  <a:schemeClr val="tx1">
-                    <a:alpha val="80000"/>
-                  </a:schemeClr>
-                </a:solidFill>
-              </a:rPr>
-              <a:t>Why use arrays? Store multiple values</a:t>
-            </a:r>
-          </a:p>
-          <a:p>
-            <a:r>
-              <a:rPr lang="en-GB" sz="2400" dirty="0">
-                <a:solidFill>
-                  <a:schemeClr val="tx1">
-                    <a:alpha val="80000"/>
-                  </a:schemeClr>
-                </a:solidFill>
-              </a:rPr>
-              <a:t>Examples:</a:t>
-            </a:r>
-            <a:endParaRPr lang="en-BE" sz="2400" dirty="0">
-              <a:solidFill>
-                <a:schemeClr val="tx1">
-                  <a:alpha val="80000"/>
-                </a:schemeClr>
-              </a:solidFill>
-            </a:endParaRPr>
-          </a:p>
-        </p:txBody>
-      </p:sp>
-      <p:grpSp>
-        <p:nvGrpSpPr>
-          <p:cNvPr id="15" name="Group 14">
-            <a:extLst>
-              <a:ext uri="{FF2B5EF4-FFF2-40B4-BE49-F238E27FC236}">
-                <a16:creationId xmlns:a16="http://schemas.microsoft.com/office/drawing/2014/main" id="{1B83719A-E593-69FE-9A68-E058E369B0D9}"/>
-              </a:ext>
-              <a:ext uri="{C183D7F6-B498-43B3-948B-1728B52AA6E4}">
-                <adec:decorative xmlns:adec="http://schemas.microsoft.com/office/drawing/2017/decorative" val="1"/>
-              </a:ext>
-            </a:extLst>
-          </p:cNvPr>
-          <p:cNvGrpSpPr>
-            <a:grpSpLocks noGrp="1" noUngrp="1" noRot="1" noChangeAspect="1" noMove="1" noResize="1"/>
-          </p:cNvGrpSpPr>
-          <p:nvPr>
-            <p:extLst>
-              <p:ext uri="{386F3935-93C4-4BCD-93E2-E3B085C9AB24}">
-                <p16:designElem xmlns:p16="http://schemas.microsoft.com/office/powerpoint/2015/main" val="1"/>
-              </p:ext>
-            </p:extLst>
-          </p:nvPr>
-        </p:nvGrpSpPr>
-        <p:grpSpPr>
-          <a:xfrm>
-            <a:off x="11479015" y="0"/>
-            <a:ext cx="712985" cy="6858000"/>
-            <a:chOff x="11479015" y="0"/>
-            <a:chExt cx="712985" cy="6858000"/>
-          </a:xfrm>
-          <a:effectLst>
-            <a:outerShdw blurRad="381000" dist="152400" dir="10800000" algn="ctr" rotWithShape="0">
-              <a:schemeClr val="bg1">
-                <a:alpha val="10000"/>
-              </a:schemeClr>
-            </a:outerShdw>
-          </a:effectLst>
-        </p:grpSpPr>
-        <p:sp>
-          <p:nvSpPr>
-            <p:cNvPr id="11" name="Freeform: Shape 10">
-              <a:extLst>
-                <a:ext uri="{FF2B5EF4-FFF2-40B4-BE49-F238E27FC236}">
-                  <a16:creationId xmlns:a16="http://schemas.microsoft.com/office/drawing/2014/main" id="{22494A31-6C5F-A8C8-6942-186A3D9F42D9}"/>
-                </a:ext>
-                <a:ext uri="{C183D7F6-B498-43B3-948B-1728B52AA6E4}">
-                  <adec:decorative xmlns:adec="http://schemas.microsoft.com/office/drawing/2017/decorative" val="1"/>
-                </a:ext>
-              </a:extLst>
-            </p:cNvPr>
-            <p:cNvSpPr/>
-            <p:nvPr>
-              <p:extLst>
-                <p:ext uri="{386F3935-93C4-4BCD-93E2-E3B085C9AB24}">
-                  <p16:designElem xmlns:p16="http://schemas.microsoft.com/office/powerpoint/2015/main" val="1"/>
-                </p:ext>
-              </p:extLst>
-            </p:nvPr>
-          </p:nvSpPr>
-          <p:spPr>
-            <a:xfrm>
-              <a:off x="11479018" y="0"/>
-              <a:ext cx="712982" cy="6858000"/>
-            </a:xfrm>
-            <a:custGeom>
-              <a:avLst/>
-              <a:gdLst>
-                <a:gd name="connsiteX0" fmla="*/ 280560 w 712982"/>
-                <a:gd name="connsiteY0" fmla="*/ 0 h 6858000"/>
-                <a:gd name="connsiteX1" fmla="*/ 712982 w 712982"/>
-                <a:gd name="connsiteY1" fmla="*/ 0 h 6858000"/>
-                <a:gd name="connsiteX2" fmla="*/ 712982 w 712982"/>
-                <a:gd name="connsiteY2" fmla="*/ 6858000 h 6858000"/>
-                <a:gd name="connsiteX3" fmla="*/ 372527 w 712982"/>
-                <a:gd name="connsiteY3" fmla="*/ 6858000 h 6858000"/>
-                <a:gd name="connsiteX4" fmla="*/ 372901 w 712982"/>
-                <a:gd name="connsiteY4" fmla="*/ 6835810 h 6858000"/>
-                <a:gd name="connsiteX5" fmla="*/ 363017 w 712982"/>
-                <a:gd name="connsiteY5" fmla="*/ 6518145 h 6858000"/>
-                <a:gd name="connsiteX6" fmla="*/ 310498 w 712982"/>
-                <a:gd name="connsiteY6" fmla="*/ 6393936 h 6858000"/>
-                <a:gd name="connsiteX7" fmla="*/ 305420 w 712982"/>
-                <a:gd name="connsiteY7" fmla="*/ 6355564 h 6858000"/>
-                <a:gd name="connsiteX8" fmla="*/ 311030 w 712982"/>
-                <a:gd name="connsiteY8" fmla="*/ 6267729 h 6858000"/>
-                <a:gd name="connsiteX9" fmla="*/ 281440 w 712982"/>
-                <a:gd name="connsiteY9" fmla="*/ 6090959 h 6858000"/>
-                <a:gd name="connsiteX10" fmla="*/ 258928 w 712982"/>
-                <a:gd name="connsiteY10" fmla="*/ 6026981 h 6858000"/>
-                <a:gd name="connsiteX11" fmla="*/ 245105 w 712982"/>
-                <a:gd name="connsiteY11" fmla="*/ 5991615 h 6858000"/>
-                <a:gd name="connsiteX12" fmla="*/ 197441 w 712982"/>
-                <a:gd name="connsiteY12" fmla="*/ 5807458 h 6858000"/>
-                <a:gd name="connsiteX13" fmla="*/ 159115 w 712982"/>
-                <a:gd name="connsiteY13" fmla="*/ 5727356 h 6858000"/>
-                <a:gd name="connsiteX14" fmla="*/ 152306 w 712982"/>
-                <a:gd name="connsiteY14" fmla="*/ 5705270 h 6858000"/>
-                <a:gd name="connsiteX15" fmla="*/ 150939 w 712982"/>
-                <a:gd name="connsiteY15" fmla="*/ 5580441 h 6858000"/>
-                <a:gd name="connsiteX16" fmla="*/ 187956 w 712982"/>
-                <a:gd name="connsiteY16" fmla="*/ 5482729 h 6858000"/>
-                <a:gd name="connsiteX17" fmla="*/ 201902 w 712982"/>
-                <a:gd name="connsiteY17" fmla="*/ 5463053 h 6858000"/>
-                <a:gd name="connsiteX18" fmla="*/ 168174 w 712982"/>
-                <a:gd name="connsiteY18" fmla="*/ 5205662 h 6858000"/>
-                <a:gd name="connsiteX19" fmla="*/ 157186 w 712982"/>
-                <a:gd name="connsiteY19" fmla="*/ 5166766 h 6858000"/>
-                <a:gd name="connsiteX20" fmla="*/ 163999 w 712982"/>
-                <a:gd name="connsiteY20" fmla="*/ 4972256 h 6858000"/>
-                <a:gd name="connsiteX21" fmla="*/ 163388 w 712982"/>
-                <a:gd name="connsiteY21" fmla="*/ 4915833 h 6858000"/>
-                <a:gd name="connsiteX22" fmla="*/ 166361 w 712982"/>
-                <a:gd name="connsiteY22" fmla="*/ 4712964 h 6858000"/>
-                <a:gd name="connsiteX23" fmla="*/ 140122 w 712982"/>
-                <a:gd name="connsiteY23" fmla="*/ 4687152 h 6858000"/>
-                <a:gd name="connsiteX24" fmla="*/ 73058 w 712982"/>
-                <a:gd name="connsiteY24" fmla="*/ 4611951 h 6858000"/>
-                <a:gd name="connsiteX25" fmla="*/ 3979 w 712982"/>
-                <a:gd name="connsiteY25" fmla="*/ 4456771 h 6858000"/>
-                <a:gd name="connsiteX26" fmla="*/ 2091 w 712982"/>
-                <a:gd name="connsiteY26" fmla="*/ 4412781 h 6858000"/>
-                <a:gd name="connsiteX27" fmla="*/ 75905 w 712982"/>
-                <a:gd name="connsiteY27" fmla="*/ 4292897 h 6858000"/>
-                <a:gd name="connsiteX28" fmla="*/ 104434 w 712982"/>
-                <a:gd name="connsiteY28" fmla="*/ 4235333 h 6858000"/>
-                <a:gd name="connsiteX29" fmla="*/ 151065 w 712982"/>
-                <a:gd name="connsiteY29" fmla="*/ 4075686 h 6858000"/>
-                <a:gd name="connsiteX30" fmla="*/ 161243 w 712982"/>
-                <a:gd name="connsiteY30" fmla="*/ 4061695 h 6858000"/>
-                <a:gd name="connsiteX31" fmla="*/ 286285 w 712982"/>
-                <a:gd name="connsiteY31" fmla="*/ 3933862 h 6858000"/>
-                <a:gd name="connsiteX32" fmla="*/ 306926 w 712982"/>
-                <a:gd name="connsiteY32" fmla="*/ 3905847 h 6858000"/>
-                <a:gd name="connsiteX33" fmla="*/ 340015 w 712982"/>
-                <a:gd name="connsiteY33" fmla="*/ 3871199 h 6858000"/>
-                <a:gd name="connsiteX34" fmla="*/ 400111 w 712982"/>
-                <a:gd name="connsiteY34" fmla="*/ 3767743 h 6858000"/>
-                <a:gd name="connsiteX35" fmla="*/ 409694 w 712982"/>
-                <a:gd name="connsiteY35" fmla="*/ 3646690 h 6858000"/>
-                <a:gd name="connsiteX36" fmla="*/ 428447 w 712982"/>
-                <a:gd name="connsiteY36" fmla="*/ 3499752 h 6858000"/>
-                <a:gd name="connsiteX37" fmla="*/ 445033 w 712982"/>
-                <a:gd name="connsiteY37" fmla="*/ 3437349 h 6858000"/>
-                <a:gd name="connsiteX38" fmla="*/ 471431 w 712982"/>
-                <a:gd name="connsiteY38" fmla="*/ 3272018 h 6858000"/>
-                <a:gd name="connsiteX39" fmla="*/ 495919 w 712982"/>
-                <a:gd name="connsiteY39" fmla="*/ 3153432 h 6858000"/>
-                <a:gd name="connsiteX40" fmla="*/ 499541 w 712982"/>
-                <a:gd name="connsiteY40" fmla="*/ 2985907 h 6858000"/>
-                <a:gd name="connsiteX41" fmla="*/ 491640 w 712982"/>
-                <a:gd name="connsiteY41" fmla="*/ 2905697 h 6858000"/>
-                <a:gd name="connsiteX42" fmla="*/ 586592 w 712982"/>
-                <a:gd name="connsiteY42" fmla="*/ 2746325 h 6858000"/>
-                <a:gd name="connsiteX43" fmla="*/ 647211 w 712982"/>
-                <a:gd name="connsiteY43" fmla="*/ 2620857 h 6858000"/>
-                <a:gd name="connsiteX44" fmla="*/ 598120 w 712982"/>
-                <a:gd name="connsiteY44" fmla="*/ 2501248 h 6858000"/>
-                <a:gd name="connsiteX45" fmla="*/ 560897 w 712982"/>
-                <a:gd name="connsiteY45" fmla="*/ 2471368 h 6858000"/>
-                <a:gd name="connsiteX46" fmla="*/ 506928 w 712982"/>
-                <a:gd name="connsiteY46" fmla="*/ 2272389 h 6858000"/>
-                <a:gd name="connsiteX47" fmla="*/ 474122 w 712982"/>
-                <a:gd name="connsiteY47" fmla="*/ 1983284 h 6858000"/>
-                <a:gd name="connsiteX48" fmla="*/ 349180 w 712982"/>
-                <a:gd name="connsiteY48" fmla="*/ 1510207 h 6858000"/>
-                <a:gd name="connsiteX49" fmla="*/ 306451 w 712982"/>
-                <a:gd name="connsiteY49" fmla="*/ 1430003 h 6858000"/>
-                <a:gd name="connsiteX50" fmla="*/ 287747 w 712982"/>
-                <a:gd name="connsiteY50" fmla="*/ 1336633 h 6858000"/>
-                <a:gd name="connsiteX51" fmla="*/ 304326 w 712982"/>
-                <a:gd name="connsiteY51" fmla="*/ 1298229 h 6858000"/>
-                <a:gd name="connsiteX52" fmla="*/ 317671 w 712982"/>
-                <a:gd name="connsiteY52" fmla="*/ 1136667 h 6858000"/>
-                <a:gd name="connsiteX53" fmla="*/ 314959 w 712982"/>
-                <a:gd name="connsiteY53" fmla="*/ 1106522 h 6858000"/>
-                <a:gd name="connsiteX54" fmla="*/ 290675 w 712982"/>
-                <a:gd name="connsiteY54" fmla="*/ 1004980 h 6858000"/>
-                <a:gd name="connsiteX55" fmla="*/ 272712 w 712982"/>
-                <a:gd name="connsiteY55" fmla="*/ 910357 h 6858000"/>
-                <a:gd name="connsiteX56" fmla="*/ 270963 w 712982"/>
-                <a:gd name="connsiteY56" fmla="*/ 667028 h 6858000"/>
-                <a:gd name="connsiteX57" fmla="*/ 244986 w 712982"/>
-                <a:gd name="connsiteY57" fmla="*/ 483131 h 6858000"/>
-                <a:gd name="connsiteX58" fmla="*/ 241465 w 712982"/>
-                <a:gd name="connsiteY58" fmla="*/ 397465 h 6858000"/>
-                <a:gd name="connsiteX59" fmla="*/ 244890 w 712982"/>
-                <a:gd name="connsiteY59" fmla="*/ 348507 h 6858000"/>
-                <a:gd name="connsiteX60" fmla="*/ 293439 w 712982"/>
-                <a:gd name="connsiteY60" fmla="*/ 233141 h 6858000"/>
-                <a:gd name="connsiteX61" fmla="*/ 300513 w 712982"/>
-                <a:gd name="connsiteY61" fmla="*/ 172069 h 6858000"/>
-              </a:gdLst>
-              <a:ahLst/>
-              <a:cxnLst>
-                <a:cxn ang="0">
-                  <a:pos x="connsiteX0" y="connsiteY0"/>
-                </a:cxn>
-                <a:cxn ang="0">
-                  <a:pos x="connsiteX1" y="connsiteY1"/>
-                </a:cxn>
-                <a:cxn ang="0">
-                  <a:pos x="connsiteX2" y="connsiteY2"/>
-                </a:cxn>
-                <a:cxn ang="0">
-                  <a:pos x="connsiteX3" y="connsiteY3"/>
-                </a:cxn>
-                <a:cxn ang="0">
-                  <a:pos x="connsiteX4" y="connsiteY4"/>
-                </a:cxn>
-                <a:cxn ang="0">
-                  <a:pos x="connsiteX5" y="connsiteY5"/>
-                </a:cxn>
-                <a:cxn ang="0">
-                  <a:pos x="connsiteX6" y="connsiteY6"/>
-                </a:cxn>
-                <a:cxn ang="0">
-                  <a:pos x="connsiteX7" y="connsiteY7"/>
-                </a:cxn>
-                <a:cxn ang="0">
-                  <a:pos x="connsiteX8" y="connsiteY8"/>
-                </a:cxn>
-                <a:cxn ang="0">
-                  <a:pos x="connsiteX9" y="connsiteY9"/>
-                </a:cxn>
-                <a:cxn ang="0">
-                  <a:pos x="connsiteX10" y="connsiteY10"/>
-                </a:cxn>
-                <a:cxn ang="0">
-                  <a:pos x="connsiteX11" y="connsiteY11"/>
-                </a:cxn>
-                <a:cxn ang="0">
-                  <a:pos x="connsiteX12" y="connsiteY12"/>
-                </a:cxn>
-                <a:cxn ang="0">
-                  <a:pos x="connsiteX13" y="connsiteY13"/>
-                </a:cxn>
-                <a:cxn ang="0">
-                  <a:pos x="connsiteX14" y="connsiteY14"/>
-                </a:cxn>
-                <a:cxn ang="0">
-                  <a:pos x="connsiteX15" y="connsiteY15"/>
-                </a:cxn>
-                <a:cxn ang="0">
-                  <a:pos x="connsiteX16" y="connsiteY16"/>
-                </a:cxn>
-                <a:cxn ang="0">
-                  <a:pos x="connsiteX17" y="connsiteY17"/>
-                </a:cxn>
-                <a:cxn ang="0">
-                  <a:pos x="connsiteX18" y="connsiteY18"/>
-                </a:cxn>
-                <a:cxn ang="0">
-                  <a:pos x="connsiteX19" y="connsiteY19"/>
-                </a:cxn>
-                <a:cxn ang="0">
-                  <a:pos x="connsiteX20" y="connsiteY20"/>
-                </a:cxn>
-                <a:cxn ang="0">
-                  <a:pos x="connsiteX21" y="connsiteY21"/>
-                </a:cxn>
-                <a:cxn ang="0">
-                  <a:pos x="connsiteX22" y="connsiteY22"/>
-                </a:cxn>
-                <a:cxn ang="0">
-                  <a:pos x="connsiteX23" y="connsiteY23"/>
-                </a:cxn>
-                <a:cxn ang="0">
-                  <a:pos x="connsiteX24" y="connsiteY24"/>
-                </a:cxn>
-                <a:cxn ang="0">
-                  <a:pos x="connsiteX25" y="connsiteY25"/>
-                </a:cxn>
-                <a:cxn ang="0">
-                  <a:pos x="connsiteX26" y="connsiteY26"/>
-                </a:cxn>
-                <a:cxn ang="0">
-                  <a:pos x="connsiteX27" y="connsiteY27"/>
-                </a:cxn>
-                <a:cxn ang="0">
-                  <a:pos x="connsiteX28" y="connsiteY28"/>
-                </a:cxn>
-                <a:cxn ang="0">
-                  <a:pos x="connsiteX29" y="connsiteY29"/>
-                </a:cxn>
-                <a:cxn ang="0">
-                  <a:pos x="connsiteX30" y="connsiteY30"/>
-                </a:cxn>
-                <a:cxn ang="0">
-                  <a:pos x="connsiteX31" y="connsiteY31"/>
-                </a:cxn>
-                <a:cxn ang="0">
-                  <a:pos x="connsiteX32" y="connsiteY32"/>
-                </a:cxn>
-                <a:cxn ang="0">
-                  <a:pos x="connsiteX33" y="connsiteY33"/>
-                </a:cxn>
-                <a:cxn ang="0">
-                  <a:pos x="connsiteX34" y="connsiteY34"/>
-                </a:cxn>
-                <a:cxn ang="0">
-                  <a:pos x="connsiteX35" y="connsiteY35"/>
-                </a:cxn>
-                <a:cxn ang="0">
-                  <a:pos x="connsiteX36" y="connsiteY36"/>
-                </a:cxn>
-                <a:cxn ang="0">
-                  <a:pos x="connsiteX37" y="connsiteY37"/>
-                </a:cxn>
-                <a:cxn ang="0">
-                  <a:pos x="connsiteX38" y="connsiteY38"/>
-                </a:cxn>
-                <a:cxn ang="0">
-                  <a:pos x="connsiteX39" y="connsiteY39"/>
-                </a:cxn>
-                <a:cxn ang="0">
-                  <a:pos x="connsiteX40" y="connsiteY40"/>
-                </a:cxn>
-                <a:cxn ang="0">
-                  <a:pos x="connsiteX41" y="connsiteY41"/>
-                </a:cxn>
-                <a:cxn ang="0">
-                  <a:pos x="connsiteX42" y="connsiteY42"/>
-                </a:cxn>
-                <a:cxn ang="0">
-                  <a:pos x="connsiteX43" y="connsiteY43"/>
-                </a:cxn>
-                <a:cxn ang="0">
-                  <a:pos x="connsiteX44" y="connsiteY44"/>
-                </a:cxn>
-                <a:cxn ang="0">
-                  <a:pos x="connsiteX45" y="connsiteY45"/>
-                </a:cxn>
-                <a:cxn ang="0">
-                  <a:pos x="connsiteX46" y="connsiteY46"/>
-                </a:cxn>
-                <a:cxn ang="0">
-                  <a:pos x="connsiteX47" y="connsiteY47"/>
-                </a:cxn>
-                <a:cxn ang="0">
-                  <a:pos x="connsiteX48" y="connsiteY48"/>
-                </a:cxn>
-                <a:cxn ang="0">
-                  <a:pos x="connsiteX49" y="connsiteY49"/>
-                </a:cxn>
-                <a:cxn ang="0">
-                  <a:pos x="connsiteX50" y="connsiteY50"/>
-                </a:cxn>
-                <a:cxn ang="0">
-                  <a:pos x="connsiteX51" y="connsiteY51"/>
-                </a:cxn>
-                <a:cxn ang="0">
-                  <a:pos x="connsiteX52" y="connsiteY52"/>
-                </a:cxn>
-                <a:cxn ang="0">
-                  <a:pos x="connsiteX53" y="connsiteY53"/>
-                </a:cxn>
-                <a:cxn ang="0">
-                  <a:pos x="connsiteX54" y="connsiteY54"/>
-                </a:cxn>
-                <a:cxn ang="0">
-                  <a:pos x="connsiteX55" y="connsiteY55"/>
-                </a:cxn>
-                <a:cxn ang="0">
-                  <a:pos x="connsiteX56" y="connsiteY56"/>
-                </a:cxn>
-                <a:cxn ang="0">
-                  <a:pos x="connsiteX57" y="connsiteY57"/>
-                </a:cxn>
-                <a:cxn ang="0">
-                  <a:pos x="connsiteX58" y="connsiteY58"/>
-                </a:cxn>
-                <a:cxn ang="0">
-                  <a:pos x="connsiteX59" y="connsiteY59"/>
-                </a:cxn>
-                <a:cxn ang="0">
-                  <a:pos x="connsiteX60" y="connsiteY60"/>
-                </a:cxn>
-                <a:cxn ang="0">
-                  <a:pos x="connsiteX61" y="connsiteY61"/>
-                </a:cxn>
-              </a:cxnLst>
-              <a:rect l="l" t="t" r="r" b="b"/>
-              <a:pathLst>
-                <a:path w="712982" h="6858000">
-                  <a:moveTo>
-                    <a:pt x="280560" y="0"/>
-                  </a:moveTo>
-                  <a:lnTo>
-                    <a:pt x="712982" y="0"/>
-                  </a:lnTo>
-                  <a:lnTo>
-                    <a:pt x="712982" y="6858000"/>
-                  </a:lnTo>
-                  <a:lnTo>
-                    <a:pt x="372527" y="6858000"/>
-                  </a:lnTo>
-                  <a:lnTo>
-                    <a:pt x="372901" y="6835810"/>
-                  </a:lnTo>
-                  <a:cubicBezTo>
-                    <a:pt x="343741" y="6729822"/>
-                    <a:pt x="373381" y="6623551"/>
-                    <a:pt x="363017" y="6518145"/>
-                  </a:cubicBezTo>
-                  <a:cubicBezTo>
-                    <a:pt x="358372" y="6470360"/>
-                    <a:pt x="362468" y="6422202"/>
-                    <a:pt x="310498" y="6393936"/>
-                  </a:cubicBezTo>
-                  <a:cubicBezTo>
-                    <a:pt x="303659" y="6390296"/>
-                    <a:pt x="304819" y="6368800"/>
-                    <a:pt x="305420" y="6355564"/>
-                  </a:cubicBezTo>
-                  <a:cubicBezTo>
-                    <a:pt x="306594" y="6326166"/>
-                    <a:pt x="314451" y="6296329"/>
-                    <a:pt x="311030" y="6267729"/>
-                  </a:cubicBezTo>
-                  <a:cubicBezTo>
-                    <a:pt x="304253" y="6208466"/>
-                    <a:pt x="293104" y="6149393"/>
-                    <a:pt x="281440" y="6090959"/>
-                  </a:cubicBezTo>
-                  <a:cubicBezTo>
-                    <a:pt x="276978" y="6068911"/>
-                    <a:pt x="266829" y="6048361"/>
-                    <a:pt x="258928" y="6026981"/>
-                  </a:cubicBezTo>
-                  <a:cubicBezTo>
-                    <a:pt x="254416" y="6015184"/>
-                    <a:pt x="244605" y="6003083"/>
-                    <a:pt x="245105" y="5991615"/>
-                  </a:cubicBezTo>
-                  <a:cubicBezTo>
-                    <a:pt x="248075" y="5925141"/>
-                    <a:pt x="216651" y="5867990"/>
-                    <a:pt x="197441" y="5807458"/>
-                  </a:cubicBezTo>
-                  <a:cubicBezTo>
-                    <a:pt x="188523" y="5779456"/>
-                    <a:pt x="171697" y="5754078"/>
-                    <a:pt x="159115" y="5727356"/>
-                  </a:cubicBezTo>
-                  <a:cubicBezTo>
-                    <a:pt x="155717" y="5720411"/>
-                    <a:pt x="152517" y="5712566"/>
-                    <a:pt x="152306" y="5705270"/>
-                  </a:cubicBezTo>
-                  <a:cubicBezTo>
-                    <a:pt x="151252" y="5663532"/>
-                    <a:pt x="151674" y="5621922"/>
-                    <a:pt x="150939" y="5580441"/>
-                  </a:cubicBezTo>
-                  <a:cubicBezTo>
-                    <a:pt x="150326" y="5542748"/>
-                    <a:pt x="147369" y="5505023"/>
-                    <a:pt x="187956" y="5482729"/>
-                  </a:cubicBezTo>
-                  <a:cubicBezTo>
-                    <a:pt x="194324" y="5479395"/>
-                    <a:pt x="198291" y="5470181"/>
-                    <a:pt x="201902" y="5463053"/>
-                  </a:cubicBezTo>
-                  <a:cubicBezTo>
-                    <a:pt x="257480" y="5353065"/>
-                    <a:pt x="249730" y="5298303"/>
-                    <a:pt x="168174" y="5205662"/>
-                  </a:cubicBezTo>
-                  <a:cubicBezTo>
-                    <a:pt x="159805" y="5196040"/>
-                    <a:pt x="152161" y="5174340"/>
-                    <a:pt x="157186" y="5166766"/>
-                  </a:cubicBezTo>
-                  <a:cubicBezTo>
-                    <a:pt x="198743" y="5102508"/>
-                    <a:pt x="186477" y="5038579"/>
-                    <a:pt x="163999" y="4972256"/>
-                  </a:cubicBezTo>
-                  <a:cubicBezTo>
-                    <a:pt x="158020" y="4955056"/>
-                    <a:pt x="155299" y="4930181"/>
-                    <a:pt x="163388" y="4915833"/>
-                  </a:cubicBezTo>
-                  <a:cubicBezTo>
-                    <a:pt x="200708" y="4847649"/>
-                    <a:pt x="186907" y="4780374"/>
-                    <a:pt x="166361" y="4712964"/>
-                  </a:cubicBezTo>
-                  <a:cubicBezTo>
-                    <a:pt x="163165" y="4702485"/>
-                    <a:pt x="150748" y="4690669"/>
-                    <a:pt x="140122" y="4687152"/>
-                  </a:cubicBezTo>
-                  <a:cubicBezTo>
-                    <a:pt x="102452" y="4674589"/>
-                    <a:pt x="86917" y="4644970"/>
-                    <a:pt x="73058" y="4611951"/>
-                  </a:cubicBezTo>
-                  <a:cubicBezTo>
-                    <a:pt x="50686" y="4559957"/>
-                    <a:pt x="25516" y="4509149"/>
-                    <a:pt x="3979" y="4456771"/>
-                  </a:cubicBezTo>
-                  <a:cubicBezTo>
-                    <a:pt x="-1236" y="4443877"/>
-                    <a:pt x="-726" y="4427139"/>
-                    <a:pt x="2091" y="4412781"/>
-                  </a:cubicBezTo>
-                  <a:cubicBezTo>
-                    <a:pt x="11653" y="4363733"/>
-                    <a:pt x="45382" y="4329603"/>
-                    <a:pt x="75905" y="4292897"/>
-                  </a:cubicBezTo>
-                  <a:cubicBezTo>
-                    <a:pt x="89361" y="4276787"/>
-                    <a:pt x="97880" y="4255660"/>
-                    <a:pt x="104434" y="4235333"/>
-                  </a:cubicBezTo>
-                  <a:cubicBezTo>
-                    <a:pt x="121200" y="4182569"/>
-                    <a:pt x="135523" y="4128901"/>
-                    <a:pt x="151065" y="4075686"/>
-                  </a:cubicBezTo>
-                  <a:cubicBezTo>
-                    <a:pt x="152552" y="4070549"/>
-                    <a:pt x="157315" y="4065932"/>
-                    <a:pt x="161243" y="4061695"/>
-                  </a:cubicBezTo>
-                  <a:cubicBezTo>
-                    <a:pt x="202828" y="4019095"/>
-                    <a:pt x="244731" y="3976753"/>
-                    <a:pt x="286285" y="3933862"/>
-                  </a:cubicBezTo>
-                  <a:cubicBezTo>
-                    <a:pt x="294168" y="3925683"/>
-                    <a:pt x="299393" y="3914571"/>
-                    <a:pt x="306926" y="3905847"/>
-                  </a:cubicBezTo>
-                  <a:cubicBezTo>
-                    <a:pt x="317292" y="3893589"/>
-                    <a:pt x="326766" y="3878502"/>
-                    <a:pt x="340015" y="3871199"/>
-                  </a:cubicBezTo>
-                  <a:cubicBezTo>
-                    <a:pt x="381725" y="3848490"/>
-                    <a:pt x="396760" y="3812013"/>
-                    <a:pt x="400111" y="3767743"/>
-                  </a:cubicBezTo>
-                  <a:cubicBezTo>
-                    <a:pt x="403294" y="3727294"/>
-                    <a:pt x="405323" y="3686973"/>
-                    <a:pt x="409694" y="3646690"/>
-                  </a:cubicBezTo>
-                  <a:cubicBezTo>
-                    <a:pt x="414852" y="3597538"/>
-                    <a:pt x="420910" y="3548579"/>
-                    <a:pt x="428447" y="3499752"/>
-                  </a:cubicBezTo>
-                  <a:cubicBezTo>
-                    <a:pt x="431696" y="3478619"/>
-                    <a:pt x="435683" y="3456228"/>
-                    <a:pt x="445033" y="3437349"/>
-                  </a:cubicBezTo>
-                  <a:cubicBezTo>
-                    <a:pt x="470858" y="3384475"/>
-                    <a:pt x="486179" y="3329236"/>
-                    <a:pt x="471431" y="3272018"/>
-                  </a:cubicBezTo>
-                  <a:cubicBezTo>
-                    <a:pt x="459682" y="3226180"/>
-                    <a:pt x="472474" y="3185267"/>
-                    <a:pt x="495919" y="3153432"/>
-                  </a:cubicBezTo>
-                  <a:cubicBezTo>
-                    <a:pt x="538461" y="3095505"/>
-                    <a:pt x="521296" y="3040311"/>
-                    <a:pt x="499541" y="2985907"/>
-                  </a:cubicBezTo>
-                  <a:cubicBezTo>
-                    <a:pt x="488276" y="2957871"/>
-                    <a:pt x="486838" y="2934028"/>
-                    <a:pt x="491640" y="2905697"/>
-                  </a:cubicBezTo>
-                  <a:cubicBezTo>
-                    <a:pt x="502898" y="2840071"/>
-                    <a:pt x="547705" y="2792141"/>
-                    <a:pt x="586592" y="2746325"/>
-                  </a:cubicBezTo>
-                  <a:cubicBezTo>
-                    <a:pt x="619786" y="2707275"/>
-                    <a:pt x="636305" y="2665661"/>
-                    <a:pt x="647211" y="2620857"/>
-                  </a:cubicBezTo>
-                  <a:cubicBezTo>
-                    <a:pt x="661216" y="2564298"/>
-                    <a:pt x="648982" y="2522027"/>
-                    <a:pt x="598120" y="2501248"/>
-                  </a:cubicBezTo>
-                  <a:cubicBezTo>
-                    <a:pt x="583733" y="2495506"/>
-                    <a:pt x="566431" y="2484521"/>
-                    <a:pt x="560897" y="2471368"/>
-                  </a:cubicBezTo>
-                  <a:cubicBezTo>
-                    <a:pt x="533469" y="2407931"/>
-                    <a:pt x="496686" y="2344634"/>
-                    <a:pt x="506928" y="2272389"/>
-                  </a:cubicBezTo>
-                  <a:cubicBezTo>
-                    <a:pt x="520879" y="2172517"/>
-                    <a:pt x="509052" y="2077807"/>
-                    <a:pt x="474122" y="1983284"/>
-                  </a:cubicBezTo>
-                  <a:cubicBezTo>
-                    <a:pt x="417537" y="1829959"/>
-                    <a:pt x="358639" y="1676886"/>
-                    <a:pt x="349180" y="1510207"/>
-                  </a:cubicBezTo>
-                  <a:cubicBezTo>
-                    <a:pt x="347619" y="1482573"/>
-                    <a:pt x="326399" y="1451821"/>
-                    <a:pt x="306451" y="1430003"/>
-                  </a:cubicBezTo>
-                  <a:cubicBezTo>
-                    <a:pt x="268511" y="1388202"/>
-                    <a:pt x="266127" y="1390512"/>
-                    <a:pt x="287747" y="1336633"/>
-                  </a:cubicBezTo>
-                  <a:cubicBezTo>
-                    <a:pt x="293070" y="1323756"/>
-                    <a:pt x="295470" y="1308272"/>
-                    <a:pt x="304326" y="1298229"/>
-                  </a:cubicBezTo>
-                  <a:cubicBezTo>
-                    <a:pt x="349361" y="1247057"/>
-                    <a:pt x="331041" y="1191986"/>
-                    <a:pt x="317671" y="1136667"/>
-                  </a:cubicBezTo>
-                  <a:cubicBezTo>
-                    <a:pt x="315148" y="1126990"/>
-                    <a:pt x="311827" y="1115354"/>
-                    <a:pt x="314959" y="1106522"/>
-                  </a:cubicBezTo>
-                  <a:cubicBezTo>
-                    <a:pt x="329032" y="1066641"/>
-                    <a:pt x="319157" y="1035231"/>
-                    <a:pt x="290675" y="1004980"/>
-                  </a:cubicBezTo>
-                  <a:cubicBezTo>
-                    <a:pt x="266138" y="978690"/>
-                    <a:pt x="249805" y="947108"/>
-                    <a:pt x="272712" y="910357"/>
-                  </a:cubicBezTo>
-                  <a:cubicBezTo>
-                    <a:pt x="323486" y="828702"/>
-                    <a:pt x="317578" y="747981"/>
-                    <a:pt x="270963" y="667028"/>
-                  </a:cubicBezTo>
-                  <a:cubicBezTo>
-                    <a:pt x="237707" y="609204"/>
-                    <a:pt x="225082" y="549995"/>
-                    <a:pt x="244986" y="483131"/>
-                  </a:cubicBezTo>
-                  <a:cubicBezTo>
-                    <a:pt x="252708" y="457408"/>
-                    <a:pt x="242285" y="426353"/>
-                    <a:pt x="241465" y="397465"/>
-                  </a:cubicBezTo>
-                  <a:cubicBezTo>
-                    <a:pt x="240850" y="381142"/>
-                    <a:pt x="239176" y="363176"/>
-                    <a:pt x="244890" y="348507"/>
-                  </a:cubicBezTo>
-                  <a:cubicBezTo>
-                    <a:pt x="259350" y="309454"/>
-                    <a:pt x="279299" y="272445"/>
-                    <a:pt x="293439" y="233141"/>
-                  </a:cubicBezTo>
-                  <a:cubicBezTo>
-                    <a:pt x="300152" y="214256"/>
-                    <a:pt x="302437" y="192349"/>
-                    <a:pt x="300513" y="172069"/>
-                  </a:cubicBezTo>
-                  <a:close/>
-                </a:path>
-              </a:pathLst>
-            </a:custGeom>
-            <a:solidFill>
-              <a:srgbClr val="FFFFFF"/>
-            </a:solidFill>
-            <a:ln w="12700" cap="flat" cmpd="sng" algn="ctr">
-              <a:noFill/>
-              <a:prstDash val="solid"/>
-              <a:miter lim="800000"/>
-            </a:ln>
-            <a:effectLst/>
-          </p:spPr>
-          <p:style>
-            <a:lnRef idx="2">
-              <a:schemeClr val="accent1">
-                <a:shade val="50000"/>
-              </a:schemeClr>
-            </a:lnRef>
-            <a:fillRef idx="1">
-              <a:schemeClr val="accent1"/>
-            </a:fillRef>
-            <a:effectRef idx="0">
-              <a:schemeClr val="accent1"/>
-            </a:effectRef>
-            <a:fontRef idx="minor">
-              <a:schemeClr val="lt1"/>
-            </a:fontRef>
-          </p:style>
-          <p:txBody>
-            <a:bodyPr wrap="square" rtlCol="0" anchor="ctr">
-              <a:noAutofit/>
-            </a:bodyPr>
-            <a:lstStyle/>
-            <a:p>
-              <a:pPr marL="0" marR="0" lvl="0" indent="0" algn="ctr" defTabSz="914400" rtl="0" eaLnBrk="1" fontAlgn="auto" latinLnBrk="0" hangingPunct="1">
-                <a:lnSpc>
-                  <a:spcPct val="100000"/>
-                </a:lnSpc>
-                <a:spcBef>
-                  <a:spcPts val="0"/>
-                </a:spcBef>
-                <a:spcAft>
-                  <a:spcPts val="0"/>
-                </a:spcAft>
-                <a:buClrTx/>
-                <a:buSzTx/>
-                <a:buFontTx/>
-                <a:buNone/>
-                <a:tabLst/>
-                <a:defRPr/>
-              </a:pPr>
-              <a:endParaRPr kumimoji="0" lang="en-US" sz="1800" b="0" i="0" u="none" strike="noStrike" kern="1200" cap="none" spc="0" normalizeH="0" baseline="0" noProof="0">
-                <a:ln>
-                  <a:noFill/>
-                </a:ln>
-                <a:solidFill>
-                  <a:prstClr val="white"/>
-                </a:solidFill>
-                <a:effectLst/>
-                <a:uLnTx/>
-                <a:uFillTx/>
-                <a:latin typeface="Aptos" panose="02110004020202020204"/>
-                <a:ea typeface="+mn-ea"/>
-                <a:cs typeface="+mn-cs"/>
-              </a:endParaRPr>
-            </a:p>
-          </p:txBody>
-        </p:sp>
-        <p:sp>
-          <p:nvSpPr>
-            <p:cNvPr id="16" name="Freeform: Shape 11">
-              <a:extLst>
-                <a:ext uri="{FF2B5EF4-FFF2-40B4-BE49-F238E27FC236}">
-                  <a16:creationId xmlns:a16="http://schemas.microsoft.com/office/drawing/2014/main" id="{457D3732-8229-3D62-E0A9-1CCCA4F9BE57}"/>
-                </a:ext>
-                <a:ext uri="{C183D7F6-B498-43B3-948B-1728B52AA6E4}">
-                  <adec:decorative xmlns:adec="http://schemas.microsoft.com/office/drawing/2017/decorative" val="1"/>
-                </a:ext>
-              </a:extLst>
-            </p:cNvPr>
-            <p:cNvSpPr/>
-            <p:nvPr>
-              <p:extLst>
-                <p:ext uri="{386F3935-93C4-4BCD-93E2-E3B085C9AB24}">
-                  <p16:designElem xmlns:p16="http://schemas.microsoft.com/office/powerpoint/2015/main" val="1"/>
-                </p:ext>
-              </p:extLst>
-            </p:nvPr>
-          </p:nvSpPr>
-          <p:spPr>
-            <a:xfrm>
-              <a:off x="11479015" y="0"/>
-              <a:ext cx="712985" cy="6858000"/>
-            </a:xfrm>
-            <a:custGeom>
-              <a:avLst/>
-              <a:gdLst>
-                <a:gd name="connsiteX0" fmla="*/ 280560 w 712985"/>
-                <a:gd name="connsiteY0" fmla="*/ 0 h 6858000"/>
-                <a:gd name="connsiteX1" fmla="*/ 712985 w 712985"/>
-                <a:gd name="connsiteY1" fmla="*/ 0 h 6858000"/>
-                <a:gd name="connsiteX2" fmla="*/ 712985 w 712985"/>
-                <a:gd name="connsiteY2" fmla="*/ 6858000 h 6858000"/>
-                <a:gd name="connsiteX3" fmla="*/ 372527 w 712985"/>
-                <a:gd name="connsiteY3" fmla="*/ 6858000 h 6858000"/>
-                <a:gd name="connsiteX4" fmla="*/ 372901 w 712985"/>
-                <a:gd name="connsiteY4" fmla="*/ 6835810 h 6858000"/>
-                <a:gd name="connsiteX5" fmla="*/ 363017 w 712985"/>
-                <a:gd name="connsiteY5" fmla="*/ 6518145 h 6858000"/>
-                <a:gd name="connsiteX6" fmla="*/ 310498 w 712985"/>
-                <a:gd name="connsiteY6" fmla="*/ 6393936 h 6858000"/>
-                <a:gd name="connsiteX7" fmla="*/ 305420 w 712985"/>
-                <a:gd name="connsiteY7" fmla="*/ 6355564 h 6858000"/>
-                <a:gd name="connsiteX8" fmla="*/ 311030 w 712985"/>
-                <a:gd name="connsiteY8" fmla="*/ 6267729 h 6858000"/>
-                <a:gd name="connsiteX9" fmla="*/ 281440 w 712985"/>
-                <a:gd name="connsiteY9" fmla="*/ 6090959 h 6858000"/>
-                <a:gd name="connsiteX10" fmla="*/ 258928 w 712985"/>
-                <a:gd name="connsiteY10" fmla="*/ 6026981 h 6858000"/>
-                <a:gd name="connsiteX11" fmla="*/ 245105 w 712985"/>
-                <a:gd name="connsiteY11" fmla="*/ 5991615 h 6858000"/>
-                <a:gd name="connsiteX12" fmla="*/ 197441 w 712985"/>
-                <a:gd name="connsiteY12" fmla="*/ 5807458 h 6858000"/>
-                <a:gd name="connsiteX13" fmla="*/ 159115 w 712985"/>
-                <a:gd name="connsiteY13" fmla="*/ 5727356 h 6858000"/>
-                <a:gd name="connsiteX14" fmla="*/ 152306 w 712985"/>
-                <a:gd name="connsiteY14" fmla="*/ 5705270 h 6858000"/>
-                <a:gd name="connsiteX15" fmla="*/ 150939 w 712985"/>
-                <a:gd name="connsiteY15" fmla="*/ 5580441 h 6858000"/>
-                <a:gd name="connsiteX16" fmla="*/ 187956 w 712985"/>
-                <a:gd name="connsiteY16" fmla="*/ 5482729 h 6858000"/>
-                <a:gd name="connsiteX17" fmla="*/ 201902 w 712985"/>
-                <a:gd name="connsiteY17" fmla="*/ 5463053 h 6858000"/>
-                <a:gd name="connsiteX18" fmla="*/ 168174 w 712985"/>
-                <a:gd name="connsiteY18" fmla="*/ 5205662 h 6858000"/>
-                <a:gd name="connsiteX19" fmla="*/ 157186 w 712985"/>
-                <a:gd name="connsiteY19" fmla="*/ 5166766 h 6858000"/>
-                <a:gd name="connsiteX20" fmla="*/ 163999 w 712985"/>
-                <a:gd name="connsiteY20" fmla="*/ 4972256 h 6858000"/>
-                <a:gd name="connsiteX21" fmla="*/ 163388 w 712985"/>
-                <a:gd name="connsiteY21" fmla="*/ 4915833 h 6858000"/>
-                <a:gd name="connsiteX22" fmla="*/ 166361 w 712985"/>
-                <a:gd name="connsiteY22" fmla="*/ 4712964 h 6858000"/>
-                <a:gd name="connsiteX23" fmla="*/ 140122 w 712985"/>
-                <a:gd name="connsiteY23" fmla="*/ 4687152 h 6858000"/>
-                <a:gd name="connsiteX24" fmla="*/ 73058 w 712985"/>
-                <a:gd name="connsiteY24" fmla="*/ 4611951 h 6858000"/>
-                <a:gd name="connsiteX25" fmla="*/ 3979 w 712985"/>
-                <a:gd name="connsiteY25" fmla="*/ 4456771 h 6858000"/>
-                <a:gd name="connsiteX26" fmla="*/ 2091 w 712985"/>
-                <a:gd name="connsiteY26" fmla="*/ 4412781 h 6858000"/>
-                <a:gd name="connsiteX27" fmla="*/ 75905 w 712985"/>
-                <a:gd name="connsiteY27" fmla="*/ 4292897 h 6858000"/>
-                <a:gd name="connsiteX28" fmla="*/ 104434 w 712985"/>
-                <a:gd name="connsiteY28" fmla="*/ 4235333 h 6858000"/>
-                <a:gd name="connsiteX29" fmla="*/ 151065 w 712985"/>
-                <a:gd name="connsiteY29" fmla="*/ 4075686 h 6858000"/>
-                <a:gd name="connsiteX30" fmla="*/ 161243 w 712985"/>
-                <a:gd name="connsiteY30" fmla="*/ 4061695 h 6858000"/>
-                <a:gd name="connsiteX31" fmla="*/ 286285 w 712985"/>
-                <a:gd name="connsiteY31" fmla="*/ 3933862 h 6858000"/>
-                <a:gd name="connsiteX32" fmla="*/ 306926 w 712985"/>
-                <a:gd name="connsiteY32" fmla="*/ 3905847 h 6858000"/>
-                <a:gd name="connsiteX33" fmla="*/ 340015 w 712985"/>
-                <a:gd name="connsiteY33" fmla="*/ 3871199 h 6858000"/>
-                <a:gd name="connsiteX34" fmla="*/ 400111 w 712985"/>
-                <a:gd name="connsiteY34" fmla="*/ 3767743 h 6858000"/>
-                <a:gd name="connsiteX35" fmla="*/ 409694 w 712985"/>
-                <a:gd name="connsiteY35" fmla="*/ 3646690 h 6858000"/>
-                <a:gd name="connsiteX36" fmla="*/ 428447 w 712985"/>
-                <a:gd name="connsiteY36" fmla="*/ 3499752 h 6858000"/>
-                <a:gd name="connsiteX37" fmla="*/ 445033 w 712985"/>
-                <a:gd name="connsiteY37" fmla="*/ 3437349 h 6858000"/>
-                <a:gd name="connsiteX38" fmla="*/ 471431 w 712985"/>
-                <a:gd name="connsiteY38" fmla="*/ 3272018 h 6858000"/>
-                <a:gd name="connsiteX39" fmla="*/ 495919 w 712985"/>
-                <a:gd name="connsiteY39" fmla="*/ 3153432 h 6858000"/>
-                <a:gd name="connsiteX40" fmla="*/ 499541 w 712985"/>
-                <a:gd name="connsiteY40" fmla="*/ 2985907 h 6858000"/>
-                <a:gd name="connsiteX41" fmla="*/ 491640 w 712985"/>
-                <a:gd name="connsiteY41" fmla="*/ 2905697 h 6858000"/>
-                <a:gd name="connsiteX42" fmla="*/ 586592 w 712985"/>
-                <a:gd name="connsiteY42" fmla="*/ 2746325 h 6858000"/>
-                <a:gd name="connsiteX43" fmla="*/ 647211 w 712985"/>
-                <a:gd name="connsiteY43" fmla="*/ 2620857 h 6858000"/>
-                <a:gd name="connsiteX44" fmla="*/ 598120 w 712985"/>
-                <a:gd name="connsiteY44" fmla="*/ 2501248 h 6858000"/>
-                <a:gd name="connsiteX45" fmla="*/ 560897 w 712985"/>
-                <a:gd name="connsiteY45" fmla="*/ 2471368 h 6858000"/>
-                <a:gd name="connsiteX46" fmla="*/ 506928 w 712985"/>
-                <a:gd name="connsiteY46" fmla="*/ 2272389 h 6858000"/>
-                <a:gd name="connsiteX47" fmla="*/ 474122 w 712985"/>
-                <a:gd name="connsiteY47" fmla="*/ 1983284 h 6858000"/>
-                <a:gd name="connsiteX48" fmla="*/ 349180 w 712985"/>
-                <a:gd name="connsiteY48" fmla="*/ 1510207 h 6858000"/>
-                <a:gd name="connsiteX49" fmla="*/ 306451 w 712985"/>
-                <a:gd name="connsiteY49" fmla="*/ 1430003 h 6858000"/>
-                <a:gd name="connsiteX50" fmla="*/ 287747 w 712985"/>
-                <a:gd name="connsiteY50" fmla="*/ 1336633 h 6858000"/>
-                <a:gd name="connsiteX51" fmla="*/ 304326 w 712985"/>
-                <a:gd name="connsiteY51" fmla="*/ 1298229 h 6858000"/>
-                <a:gd name="connsiteX52" fmla="*/ 317671 w 712985"/>
-                <a:gd name="connsiteY52" fmla="*/ 1136667 h 6858000"/>
-                <a:gd name="connsiteX53" fmla="*/ 314959 w 712985"/>
-                <a:gd name="connsiteY53" fmla="*/ 1106522 h 6858000"/>
-                <a:gd name="connsiteX54" fmla="*/ 290675 w 712985"/>
-                <a:gd name="connsiteY54" fmla="*/ 1004980 h 6858000"/>
-                <a:gd name="connsiteX55" fmla="*/ 272712 w 712985"/>
-                <a:gd name="connsiteY55" fmla="*/ 910357 h 6858000"/>
-                <a:gd name="connsiteX56" fmla="*/ 270963 w 712985"/>
-                <a:gd name="connsiteY56" fmla="*/ 667028 h 6858000"/>
-                <a:gd name="connsiteX57" fmla="*/ 244986 w 712985"/>
-                <a:gd name="connsiteY57" fmla="*/ 483131 h 6858000"/>
-                <a:gd name="connsiteX58" fmla="*/ 241465 w 712985"/>
-                <a:gd name="connsiteY58" fmla="*/ 397465 h 6858000"/>
-                <a:gd name="connsiteX59" fmla="*/ 244890 w 712985"/>
-                <a:gd name="connsiteY59" fmla="*/ 348507 h 6858000"/>
-                <a:gd name="connsiteX60" fmla="*/ 293439 w 712985"/>
-                <a:gd name="connsiteY60" fmla="*/ 233141 h 6858000"/>
-                <a:gd name="connsiteX61" fmla="*/ 300513 w 712985"/>
-                <a:gd name="connsiteY61" fmla="*/ 172069 h 6858000"/>
-              </a:gdLst>
-              <a:ahLst/>
-              <a:cxnLst>
-                <a:cxn ang="0">
-                  <a:pos x="connsiteX0" y="connsiteY0"/>
-                </a:cxn>
-                <a:cxn ang="0">
-                  <a:pos x="connsiteX1" y="connsiteY1"/>
-                </a:cxn>
-                <a:cxn ang="0">
-                  <a:pos x="connsiteX2" y="connsiteY2"/>
-                </a:cxn>
-                <a:cxn ang="0">
-                  <a:pos x="connsiteX3" y="connsiteY3"/>
-                </a:cxn>
-                <a:cxn ang="0">
-                  <a:pos x="connsiteX4" y="connsiteY4"/>
-                </a:cxn>
-                <a:cxn ang="0">
-                  <a:pos x="connsiteX5" y="connsiteY5"/>
-                </a:cxn>
-                <a:cxn ang="0">
-                  <a:pos x="connsiteX6" y="connsiteY6"/>
-                </a:cxn>
-                <a:cxn ang="0">
-                  <a:pos x="connsiteX7" y="connsiteY7"/>
-                </a:cxn>
-                <a:cxn ang="0">
-                  <a:pos x="connsiteX8" y="connsiteY8"/>
-                </a:cxn>
-                <a:cxn ang="0">
-                  <a:pos x="connsiteX9" y="connsiteY9"/>
-                </a:cxn>
-                <a:cxn ang="0">
-                  <a:pos x="connsiteX10" y="connsiteY10"/>
-                </a:cxn>
-                <a:cxn ang="0">
-                  <a:pos x="connsiteX11" y="connsiteY11"/>
-                </a:cxn>
-                <a:cxn ang="0">
-                  <a:pos x="connsiteX12" y="connsiteY12"/>
-                </a:cxn>
-                <a:cxn ang="0">
-                  <a:pos x="connsiteX13" y="connsiteY13"/>
-                </a:cxn>
-                <a:cxn ang="0">
-                  <a:pos x="connsiteX14" y="connsiteY14"/>
-                </a:cxn>
-                <a:cxn ang="0">
-                  <a:pos x="connsiteX15" y="connsiteY15"/>
-                </a:cxn>
-                <a:cxn ang="0">
-                  <a:pos x="connsiteX16" y="connsiteY16"/>
-                </a:cxn>
-                <a:cxn ang="0">
-                  <a:pos x="connsiteX17" y="connsiteY17"/>
-                </a:cxn>
-                <a:cxn ang="0">
-                  <a:pos x="connsiteX18" y="connsiteY18"/>
-                </a:cxn>
-                <a:cxn ang="0">
-                  <a:pos x="connsiteX19" y="connsiteY19"/>
-                </a:cxn>
-                <a:cxn ang="0">
-                  <a:pos x="connsiteX20" y="connsiteY20"/>
-                </a:cxn>
-                <a:cxn ang="0">
-                  <a:pos x="connsiteX21" y="connsiteY21"/>
-                </a:cxn>
-                <a:cxn ang="0">
-                  <a:pos x="connsiteX22" y="connsiteY22"/>
-                </a:cxn>
-                <a:cxn ang="0">
-                  <a:pos x="connsiteX23" y="connsiteY23"/>
-                </a:cxn>
-                <a:cxn ang="0">
-                  <a:pos x="connsiteX24" y="connsiteY24"/>
-                </a:cxn>
-                <a:cxn ang="0">
-                  <a:pos x="connsiteX25" y="connsiteY25"/>
-                </a:cxn>
-                <a:cxn ang="0">
-                  <a:pos x="connsiteX26" y="connsiteY26"/>
-                </a:cxn>
-                <a:cxn ang="0">
-                  <a:pos x="connsiteX27" y="connsiteY27"/>
-                </a:cxn>
-                <a:cxn ang="0">
-                  <a:pos x="connsiteX28" y="connsiteY28"/>
-                </a:cxn>
-                <a:cxn ang="0">
-                  <a:pos x="connsiteX29" y="connsiteY29"/>
-                </a:cxn>
-                <a:cxn ang="0">
-                  <a:pos x="connsiteX30" y="connsiteY30"/>
-                </a:cxn>
-                <a:cxn ang="0">
-                  <a:pos x="connsiteX31" y="connsiteY31"/>
-                </a:cxn>
-                <a:cxn ang="0">
-                  <a:pos x="connsiteX32" y="connsiteY32"/>
-                </a:cxn>
-                <a:cxn ang="0">
-                  <a:pos x="connsiteX33" y="connsiteY33"/>
-                </a:cxn>
-                <a:cxn ang="0">
-                  <a:pos x="connsiteX34" y="connsiteY34"/>
-                </a:cxn>
-                <a:cxn ang="0">
-                  <a:pos x="connsiteX35" y="connsiteY35"/>
-                </a:cxn>
-                <a:cxn ang="0">
-                  <a:pos x="connsiteX36" y="connsiteY36"/>
-                </a:cxn>
-                <a:cxn ang="0">
-                  <a:pos x="connsiteX37" y="connsiteY37"/>
-                </a:cxn>
-                <a:cxn ang="0">
-                  <a:pos x="connsiteX38" y="connsiteY38"/>
-                </a:cxn>
-                <a:cxn ang="0">
-                  <a:pos x="connsiteX39" y="connsiteY39"/>
-                </a:cxn>
-                <a:cxn ang="0">
-                  <a:pos x="connsiteX40" y="connsiteY40"/>
-                </a:cxn>
-                <a:cxn ang="0">
-                  <a:pos x="connsiteX41" y="connsiteY41"/>
-                </a:cxn>
-                <a:cxn ang="0">
-                  <a:pos x="connsiteX42" y="connsiteY42"/>
-                </a:cxn>
-                <a:cxn ang="0">
-                  <a:pos x="connsiteX43" y="connsiteY43"/>
-                </a:cxn>
-                <a:cxn ang="0">
-                  <a:pos x="connsiteX44" y="connsiteY44"/>
-                </a:cxn>
-                <a:cxn ang="0">
-                  <a:pos x="connsiteX45" y="connsiteY45"/>
-                </a:cxn>
-                <a:cxn ang="0">
-                  <a:pos x="connsiteX46" y="connsiteY46"/>
-                </a:cxn>
-                <a:cxn ang="0">
-                  <a:pos x="connsiteX47" y="connsiteY47"/>
-                </a:cxn>
-                <a:cxn ang="0">
-                  <a:pos x="connsiteX48" y="connsiteY48"/>
-                </a:cxn>
-                <a:cxn ang="0">
-                  <a:pos x="connsiteX49" y="connsiteY49"/>
-                </a:cxn>
-                <a:cxn ang="0">
-                  <a:pos x="connsiteX50" y="connsiteY50"/>
-                </a:cxn>
-                <a:cxn ang="0">
-                  <a:pos x="connsiteX51" y="connsiteY51"/>
-                </a:cxn>
-                <a:cxn ang="0">
-                  <a:pos x="connsiteX52" y="connsiteY52"/>
-                </a:cxn>
-                <a:cxn ang="0">
-                  <a:pos x="connsiteX53" y="connsiteY53"/>
-                </a:cxn>
-                <a:cxn ang="0">
-                  <a:pos x="connsiteX54" y="connsiteY54"/>
-                </a:cxn>
-                <a:cxn ang="0">
-                  <a:pos x="connsiteX55" y="connsiteY55"/>
-                </a:cxn>
-                <a:cxn ang="0">
-                  <a:pos x="connsiteX56" y="connsiteY56"/>
-                </a:cxn>
-                <a:cxn ang="0">
-                  <a:pos x="connsiteX57" y="connsiteY57"/>
-                </a:cxn>
-                <a:cxn ang="0">
-                  <a:pos x="connsiteX58" y="connsiteY58"/>
-                </a:cxn>
-                <a:cxn ang="0">
-                  <a:pos x="connsiteX59" y="connsiteY59"/>
-                </a:cxn>
-                <a:cxn ang="0">
-                  <a:pos x="connsiteX60" y="connsiteY60"/>
-                </a:cxn>
-                <a:cxn ang="0">
-                  <a:pos x="connsiteX61" y="connsiteY61"/>
-                </a:cxn>
-              </a:cxnLst>
-              <a:rect l="l" t="t" r="r" b="b"/>
-              <a:pathLst>
-                <a:path w="712985" h="6858000">
-                  <a:moveTo>
-                    <a:pt x="280560" y="0"/>
-                  </a:moveTo>
-                  <a:lnTo>
-                    <a:pt x="712985" y="0"/>
-                  </a:lnTo>
-                  <a:lnTo>
-                    <a:pt x="712985" y="6858000"/>
-                  </a:lnTo>
-                  <a:lnTo>
-                    <a:pt x="372527" y="6858000"/>
-                  </a:lnTo>
-                  <a:lnTo>
-                    <a:pt x="372901" y="6835810"/>
-                  </a:lnTo>
-                  <a:cubicBezTo>
-                    <a:pt x="343741" y="6729822"/>
-                    <a:pt x="373381" y="6623551"/>
-                    <a:pt x="363017" y="6518145"/>
-                  </a:cubicBezTo>
-                  <a:cubicBezTo>
-                    <a:pt x="358372" y="6470360"/>
-                    <a:pt x="362468" y="6422202"/>
-                    <a:pt x="310498" y="6393936"/>
-                  </a:cubicBezTo>
-                  <a:cubicBezTo>
-                    <a:pt x="303659" y="6390296"/>
-                    <a:pt x="304819" y="6368800"/>
-                    <a:pt x="305420" y="6355564"/>
-                  </a:cubicBezTo>
-                  <a:cubicBezTo>
-                    <a:pt x="306594" y="6326166"/>
-                    <a:pt x="314451" y="6296329"/>
-                    <a:pt x="311030" y="6267729"/>
-                  </a:cubicBezTo>
-                  <a:cubicBezTo>
-                    <a:pt x="304253" y="6208466"/>
-                    <a:pt x="293104" y="6149393"/>
-                    <a:pt x="281440" y="6090959"/>
-                  </a:cubicBezTo>
-                  <a:cubicBezTo>
-                    <a:pt x="276978" y="6068911"/>
-                    <a:pt x="266829" y="6048361"/>
-                    <a:pt x="258928" y="6026981"/>
-                  </a:cubicBezTo>
-                  <a:cubicBezTo>
-                    <a:pt x="254416" y="6015184"/>
-                    <a:pt x="244605" y="6003083"/>
-                    <a:pt x="245105" y="5991615"/>
-                  </a:cubicBezTo>
-                  <a:cubicBezTo>
-                    <a:pt x="248075" y="5925141"/>
-                    <a:pt x="216651" y="5867990"/>
-                    <a:pt x="197441" y="5807458"/>
-                  </a:cubicBezTo>
-                  <a:cubicBezTo>
-                    <a:pt x="188523" y="5779456"/>
-                    <a:pt x="171697" y="5754078"/>
-                    <a:pt x="159115" y="5727356"/>
-                  </a:cubicBezTo>
-                  <a:cubicBezTo>
-                    <a:pt x="155717" y="5720411"/>
-                    <a:pt x="152517" y="5712566"/>
-                    <a:pt x="152306" y="5705270"/>
-                  </a:cubicBezTo>
-                  <a:cubicBezTo>
-                    <a:pt x="151252" y="5663532"/>
-                    <a:pt x="151674" y="5621922"/>
-                    <a:pt x="150939" y="5580441"/>
-                  </a:cubicBezTo>
-                  <a:cubicBezTo>
-                    <a:pt x="150326" y="5542748"/>
-                    <a:pt x="147369" y="5505023"/>
-                    <a:pt x="187956" y="5482729"/>
-                  </a:cubicBezTo>
-                  <a:cubicBezTo>
-                    <a:pt x="194324" y="5479395"/>
-                    <a:pt x="198291" y="5470181"/>
-                    <a:pt x="201902" y="5463053"/>
-                  </a:cubicBezTo>
-                  <a:cubicBezTo>
-                    <a:pt x="257480" y="5353065"/>
-                    <a:pt x="249730" y="5298303"/>
-                    <a:pt x="168174" y="5205662"/>
-                  </a:cubicBezTo>
-                  <a:cubicBezTo>
-                    <a:pt x="159805" y="5196040"/>
-                    <a:pt x="152161" y="5174340"/>
-                    <a:pt x="157186" y="5166766"/>
-                  </a:cubicBezTo>
-                  <a:cubicBezTo>
-                    <a:pt x="198743" y="5102508"/>
-                    <a:pt x="186477" y="5038579"/>
-                    <a:pt x="163999" y="4972256"/>
-                  </a:cubicBezTo>
-                  <a:cubicBezTo>
-                    <a:pt x="158020" y="4955056"/>
-                    <a:pt x="155299" y="4930181"/>
-                    <a:pt x="163388" y="4915833"/>
-                  </a:cubicBezTo>
-                  <a:cubicBezTo>
-                    <a:pt x="200708" y="4847649"/>
-                    <a:pt x="186907" y="4780374"/>
-                    <a:pt x="166361" y="4712964"/>
-                  </a:cubicBezTo>
-                  <a:cubicBezTo>
-                    <a:pt x="163165" y="4702485"/>
-                    <a:pt x="150748" y="4690669"/>
-                    <a:pt x="140122" y="4687152"/>
-                  </a:cubicBezTo>
-                  <a:cubicBezTo>
-                    <a:pt x="102452" y="4674589"/>
-                    <a:pt x="86917" y="4644970"/>
-                    <a:pt x="73058" y="4611951"/>
-                  </a:cubicBezTo>
-                  <a:cubicBezTo>
-                    <a:pt x="50686" y="4559957"/>
-                    <a:pt x="25516" y="4509149"/>
-                    <a:pt x="3979" y="4456771"/>
-                  </a:cubicBezTo>
-                  <a:cubicBezTo>
-                    <a:pt x="-1236" y="4443877"/>
-                    <a:pt x="-726" y="4427139"/>
-                    <a:pt x="2091" y="4412781"/>
-                  </a:cubicBezTo>
-                  <a:cubicBezTo>
-                    <a:pt x="11653" y="4363733"/>
-                    <a:pt x="45382" y="4329603"/>
-                    <a:pt x="75905" y="4292897"/>
-                  </a:cubicBezTo>
-                  <a:cubicBezTo>
-                    <a:pt x="89361" y="4276787"/>
-                    <a:pt x="97880" y="4255660"/>
-                    <a:pt x="104434" y="4235333"/>
-                  </a:cubicBezTo>
-                  <a:cubicBezTo>
-                    <a:pt x="121200" y="4182569"/>
-                    <a:pt x="135523" y="4128901"/>
-                    <a:pt x="151065" y="4075686"/>
-                  </a:cubicBezTo>
-                  <a:cubicBezTo>
-                    <a:pt x="152552" y="4070549"/>
-                    <a:pt x="157315" y="4065932"/>
-                    <a:pt x="161243" y="4061695"/>
-                  </a:cubicBezTo>
-                  <a:cubicBezTo>
-                    <a:pt x="202828" y="4019095"/>
-                    <a:pt x="244731" y="3976753"/>
-                    <a:pt x="286285" y="3933862"/>
-                  </a:cubicBezTo>
-                  <a:cubicBezTo>
-                    <a:pt x="294168" y="3925683"/>
-                    <a:pt x="299393" y="3914571"/>
-                    <a:pt x="306926" y="3905847"/>
-                  </a:cubicBezTo>
-                  <a:cubicBezTo>
-                    <a:pt x="317292" y="3893589"/>
-                    <a:pt x="326766" y="3878502"/>
-                    <a:pt x="340015" y="3871199"/>
-                  </a:cubicBezTo>
-                  <a:cubicBezTo>
-                    <a:pt x="381725" y="3848490"/>
-                    <a:pt x="396760" y="3812013"/>
-                    <a:pt x="400111" y="3767743"/>
-                  </a:cubicBezTo>
-                  <a:cubicBezTo>
-                    <a:pt x="403294" y="3727294"/>
-                    <a:pt x="405323" y="3686973"/>
-                    <a:pt x="409694" y="3646690"/>
-                  </a:cubicBezTo>
-                  <a:cubicBezTo>
-                    <a:pt x="414852" y="3597538"/>
-                    <a:pt x="420910" y="3548579"/>
-                    <a:pt x="428447" y="3499752"/>
-                  </a:cubicBezTo>
-                  <a:cubicBezTo>
-                    <a:pt x="431696" y="3478619"/>
-                    <a:pt x="435683" y="3456228"/>
-                    <a:pt x="445033" y="3437349"/>
-                  </a:cubicBezTo>
-                  <a:cubicBezTo>
-                    <a:pt x="470858" y="3384475"/>
-                    <a:pt x="486179" y="3329236"/>
-                    <a:pt x="471431" y="3272018"/>
-                  </a:cubicBezTo>
-                  <a:cubicBezTo>
-                    <a:pt x="459682" y="3226180"/>
-                    <a:pt x="472474" y="3185267"/>
-                    <a:pt x="495919" y="3153432"/>
-                  </a:cubicBezTo>
-                  <a:cubicBezTo>
-                    <a:pt x="538461" y="3095505"/>
-                    <a:pt x="521296" y="3040311"/>
-                    <a:pt x="499541" y="2985907"/>
-                  </a:cubicBezTo>
-                  <a:cubicBezTo>
-                    <a:pt x="488276" y="2957871"/>
-                    <a:pt x="486838" y="2934028"/>
-                    <a:pt x="491640" y="2905697"/>
-                  </a:cubicBezTo>
-                  <a:cubicBezTo>
-                    <a:pt x="502898" y="2840071"/>
-                    <a:pt x="547705" y="2792141"/>
-                    <a:pt x="586592" y="2746325"/>
-                  </a:cubicBezTo>
-                  <a:cubicBezTo>
-                    <a:pt x="619786" y="2707275"/>
-                    <a:pt x="636305" y="2665661"/>
-                    <a:pt x="647211" y="2620857"/>
-                  </a:cubicBezTo>
-                  <a:cubicBezTo>
-                    <a:pt x="661216" y="2564298"/>
-                    <a:pt x="648982" y="2522027"/>
-                    <a:pt x="598120" y="2501248"/>
-                  </a:cubicBezTo>
-                  <a:cubicBezTo>
-                    <a:pt x="583733" y="2495506"/>
-                    <a:pt x="566431" y="2484521"/>
-                    <a:pt x="560897" y="2471368"/>
-                  </a:cubicBezTo>
-                  <a:cubicBezTo>
-                    <a:pt x="533469" y="2407931"/>
-                    <a:pt x="496686" y="2344634"/>
-                    <a:pt x="506928" y="2272389"/>
-                  </a:cubicBezTo>
-                  <a:cubicBezTo>
-                    <a:pt x="520879" y="2172517"/>
-                    <a:pt x="509052" y="2077807"/>
-                    <a:pt x="474122" y="1983284"/>
-                  </a:cubicBezTo>
-                  <a:cubicBezTo>
-                    <a:pt x="417537" y="1829959"/>
-                    <a:pt x="358639" y="1676886"/>
-                    <a:pt x="349180" y="1510207"/>
-                  </a:cubicBezTo>
-                  <a:cubicBezTo>
-                    <a:pt x="347619" y="1482573"/>
-                    <a:pt x="326399" y="1451821"/>
-                    <a:pt x="306451" y="1430003"/>
-                  </a:cubicBezTo>
-                  <a:cubicBezTo>
-                    <a:pt x="268511" y="1388202"/>
-                    <a:pt x="266127" y="1390512"/>
-                    <a:pt x="287747" y="1336633"/>
-                  </a:cubicBezTo>
-                  <a:cubicBezTo>
-                    <a:pt x="293070" y="1323756"/>
-                    <a:pt x="295470" y="1308272"/>
-                    <a:pt x="304326" y="1298229"/>
-                  </a:cubicBezTo>
-                  <a:cubicBezTo>
-                    <a:pt x="349361" y="1247057"/>
-                    <a:pt x="331041" y="1191986"/>
-                    <a:pt x="317671" y="1136667"/>
-                  </a:cubicBezTo>
-                  <a:cubicBezTo>
-                    <a:pt x="315148" y="1126990"/>
-                    <a:pt x="311827" y="1115354"/>
-                    <a:pt x="314959" y="1106522"/>
-                  </a:cubicBezTo>
-                  <a:cubicBezTo>
-                    <a:pt x="329032" y="1066641"/>
-                    <a:pt x="319157" y="1035231"/>
-                    <a:pt x="290675" y="1004980"/>
-                  </a:cubicBezTo>
-                  <a:cubicBezTo>
-                    <a:pt x="266138" y="978690"/>
-                    <a:pt x="249805" y="947108"/>
-                    <a:pt x="272712" y="910357"/>
-                  </a:cubicBezTo>
-                  <a:cubicBezTo>
-                    <a:pt x="323486" y="828702"/>
-                    <a:pt x="317578" y="747981"/>
-                    <a:pt x="270963" y="667028"/>
-                  </a:cubicBezTo>
-                  <a:cubicBezTo>
-                    <a:pt x="237707" y="609204"/>
-                    <a:pt x="225082" y="549995"/>
-                    <a:pt x="244986" y="483131"/>
-                  </a:cubicBezTo>
-                  <a:cubicBezTo>
-                    <a:pt x="252708" y="457408"/>
-                    <a:pt x="242285" y="426353"/>
-                    <a:pt x="241465" y="397465"/>
-                  </a:cubicBezTo>
-                  <a:cubicBezTo>
-                    <a:pt x="240850" y="381142"/>
-                    <a:pt x="239176" y="363176"/>
-                    <a:pt x="244890" y="348507"/>
-                  </a:cubicBezTo>
-                  <a:cubicBezTo>
-                    <a:pt x="259350" y="309454"/>
-                    <a:pt x="279299" y="272445"/>
-                    <a:pt x="293439" y="233141"/>
-                  </a:cubicBezTo>
-                  <a:cubicBezTo>
-                    <a:pt x="300152" y="214256"/>
-                    <a:pt x="302437" y="192349"/>
-                    <a:pt x="300513" y="172069"/>
-                  </a:cubicBezTo>
-                  <a:close/>
-                </a:path>
-              </a:pathLst>
-            </a:custGeom>
-            <a:blipFill>
-              <a:blip r:embed="rId3">
-                <a:alphaModFix amt="57000"/>
-              </a:blip>
-              <a:tile tx="0" ty="0" sx="100000" sy="100000" flip="none" algn="tl"/>
-            </a:blipFill>
-            <a:ln w="12700" cap="flat" cmpd="sng" algn="ctr">
-              <a:noFill/>
-              <a:prstDash val="solid"/>
-              <a:miter lim="800000"/>
-            </a:ln>
-            <a:effectLst/>
-          </p:spPr>
-          <p:style>
-            <a:lnRef idx="2">
-              <a:schemeClr val="accent1">
-                <a:shade val="50000"/>
-              </a:schemeClr>
-            </a:lnRef>
-            <a:fillRef idx="1">
-              <a:schemeClr val="accent1"/>
-            </a:fillRef>
-            <a:effectRef idx="0">
-              <a:schemeClr val="accent1"/>
-            </a:effectRef>
-            <a:fontRef idx="minor">
-              <a:schemeClr val="lt1"/>
-            </a:fontRef>
-          </p:style>
-          <p:txBody>
-            <a:bodyPr wrap="square" rtlCol="0" anchor="ctr">
-              <a:noAutofit/>
-            </a:bodyPr>
-            <a:lstStyle/>
-            <a:p>
-              <a:pPr marL="0" marR="0" lvl="0" indent="0" algn="ctr" defTabSz="914400" rtl="0" eaLnBrk="1" fontAlgn="auto" latinLnBrk="0" hangingPunct="1">
-                <a:lnSpc>
-                  <a:spcPct val="100000"/>
-                </a:lnSpc>
-                <a:spcBef>
-                  <a:spcPts val="0"/>
-                </a:spcBef>
-                <a:spcAft>
-                  <a:spcPts val="0"/>
-                </a:spcAft>
-                <a:buClrTx/>
-                <a:buSzTx/>
-                <a:buFontTx/>
-                <a:buNone/>
-                <a:tabLst/>
-                <a:defRPr/>
-              </a:pPr>
-              <a:endParaRPr kumimoji="0" lang="en-US" sz="1800" b="0" i="0" u="none" strike="noStrike" kern="1200" cap="none" spc="0" normalizeH="0" baseline="0" noProof="0">
-                <a:ln>
-                  <a:noFill/>
-                </a:ln>
-                <a:solidFill>
-                  <a:prstClr val="white"/>
-                </a:solidFill>
-                <a:effectLst/>
-                <a:uLnTx/>
-                <a:uFillTx/>
-                <a:latin typeface="Aptos" panose="02110004020202020204"/>
-                <a:ea typeface="+mn-ea"/>
-                <a:cs typeface="+mn-cs"/>
-              </a:endParaRPr>
-            </a:p>
-          </p:txBody>
-        </p:sp>
-      </p:grpSp>
-      <p:pic>
-        <p:nvPicPr>
-          <p:cNvPr id="5" name="Picture 4">
-            <a:extLst>
-              <a:ext uri="{FF2B5EF4-FFF2-40B4-BE49-F238E27FC236}">
-                <a16:creationId xmlns:a16="http://schemas.microsoft.com/office/drawing/2014/main" id="{B5BE81DA-4377-5BAC-2954-05BB06F04AB1}"/>
-              </a:ext>
-            </a:extLst>
-          </p:cNvPr>
-          <p:cNvPicPr>
-            <a:picLocks noChangeAspect="1"/>
-          </p:cNvPicPr>
-          <p:nvPr/>
-        </p:nvPicPr>
-        <p:blipFill>
-          <a:blip r:embed="rId4"/>
-          <a:stretch>
-            <a:fillRect/>
-          </a:stretch>
-        </p:blipFill>
-        <p:spPr>
-          <a:xfrm>
-            <a:off x="5222081" y="2870200"/>
-            <a:ext cx="5295900" cy="558800"/>
-          </a:xfrm>
-          <a:prstGeom prst="rect">
-            <a:avLst/>
-          </a:prstGeom>
-        </p:spPr>
-      </p:pic>
-      <p:pic>
-        <p:nvPicPr>
-          <p:cNvPr id="10" name="Picture 9" descr="A screenshot of a computer program&#10;&#10;AI-generated content may be incorrect.">
-            <a:extLst>
-              <a:ext uri="{FF2B5EF4-FFF2-40B4-BE49-F238E27FC236}">
-                <a16:creationId xmlns:a16="http://schemas.microsoft.com/office/drawing/2014/main" id="{E21E6F54-630D-3707-1732-9C4D22681784}"/>
-              </a:ext>
-            </a:extLst>
-          </p:cNvPr>
-          <p:cNvPicPr>
-            <a:picLocks noChangeAspect="1"/>
-          </p:cNvPicPr>
-          <p:nvPr/>
-        </p:nvPicPr>
-        <p:blipFill>
-          <a:blip r:embed="rId5"/>
-          <a:stretch>
-            <a:fillRect/>
-          </a:stretch>
-        </p:blipFill>
-        <p:spPr>
-          <a:xfrm>
-            <a:off x="5222081" y="3621752"/>
-            <a:ext cx="3022600" cy="1384300"/>
-          </a:xfrm>
-          <a:prstGeom prst="rect">
-            <a:avLst/>
-          </a:prstGeom>
-        </p:spPr>
-      </p:pic>
-    </p:spTree>
-    <p:extLst>
-      <p:ext uri="{BB962C8B-B14F-4D97-AF65-F5344CB8AC3E}">
-        <p14:creationId xmlns:p14="http://schemas.microsoft.com/office/powerpoint/2010/main" val="890377132"/>
       </p:ext>
     </p:extLst>
   </p:cSld>

</xml_diff>